<commit_message>
actually right version of pptx
</commit_message>
<xml_diff>
--- a/Rviz/R Visualization and Data Manipulation.pptx
+++ b/Rviz/R Visualization and Data Manipulation.pptx
@@ -5,7 +5,7 @@
     <p:sldMasterId id="2147483707" r:id="rId1"/>
   </p:sldMasterIdLst>
   <p:notesMasterIdLst>
-    <p:notesMasterId r:id="rId49"/>
+    <p:notesMasterId r:id="rId50"/>
   </p:notesMasterIdLst>
   <p:sldIdLst>
     <p:sldId id="266" r:id="rId2"/>
@@ -35,8 +35,8 @@
     <p:sldId id="311" r:id="rId26"/>
     <p:sldId id="288" r:id="rId27"/>
     <p:sldId id="287" r:id="rId28"/>
-    <p:sldId id="313" r:id="rId29"/>
-    <p:sldId id="314" r:id="rId30"/>
+    <p:sldId id="314" r:id="rId29"/>
+    <p:sldId id="313" r:id="rId30"/>
     <p:sldId id="312" r:id="rId31"/>
     <p:sldId id="309" r:id="rId32"/>
     <p:sldId id="286" r:id="rId33"/>
@@ -48,13 +48,14 @@
     <p:sldId id="299" r:id="rId39"/>
     <p:sldId id="300" r:id="rId40"/>
     <p:sldId id="301" r:id="rId41"/>
-    <p:sldId id="298" r:id="rId42"/>
-    <p:sldId id="294" r:id="rId43"/>
-    <p:sldId id="302" r:id="rId44"/>
-    <p:sldId id="289" r:id="rId45"/>
-    <p:sldId id="295" r:id="rId46"/>
-    <p:sldId id="290" r:id="rId47"/>
-    <p:sldId id="272" r:id="rId48"/>
+    <p:sldId id="315" r:id="rId42"/>
+    <p:sldId id="298" r:id="rId43"/>
+    <p:sldId id="294" r:id="rId44"/>
+    <p:sldId id="302" r:id="rId45"/>
+    <p:sldId id="289" r:id="rId46"/>
+    <p:sldId id="295" r:id="rId47"/>
+    <p:sldId id="290" r:id="rId48"/>
+    <p:sldId id="272" r:id="rId49"/>
   </p:sldIdLst>
   <p:sldSz cx="12192000" cy="6858000"/>
   <p:notesSz cx="6858000" cy="9144000"/>
@@ -7390,7 +7391,7 @@
               <a:rPr lang="en-US" dirty="0">
                 <a:cs typeface="Courier New" panose="02070309020205020404" pitchFamily="49" charset="0"/>
               </a:rPr>
-              <a:t>Note: the first options are inherited from base R, the second options are from the </a:t>
+              <a:t>Note: the first options are inherited from base R, the other options are from the </a:t>
             </a:r>
             <a:r>
               <a:rPr lang="en-US" dirty="0" err="1">
@@ -8536,7 +8537,7 @@
             <a:pPr lvl="1"/>
             <a:r>
               <a:rPr lang="en-US" dirty="0"/>
-              <a:t>Any function passed as a formula</a:t>
+              <a:t>Any function can be passed as a formula</a:t>
             </a:r>
           </a:p>
           <a:p>
@@ -8575,7 +8576,7 @@
             </a:r>
             <a:r>
               <a:rPr lang="en-US" dirty="0"/>
-              <a:t> is the name of the parameter</a:t>
+              <a:t> is the name of the parameter of the function</a:t>
             </a:r>
           </a:p>
           <a:p>
@@ -9163,55 +9164,25 @@
           <a:p>
             <a:pPr lvl="1"/>
             <a:r>
+              <a:rPr lang="en-US" dirty="0">
+                <a:latin typeface="Courier New" panose="02070309020205020404" pitchFamily="49" charset="0"/>
+                <a:cs typeface="Courier New" panose="02070309020205020404" pitchFamily="49" charset="0"/>
+              </a:rPr>
+              <a:t>keep(</a:t>
+            </a:r>
+            <a:r>
               <a:rPr lang="en-US" dirty="0" err="1">
                 <a:latin typeface="Courier New" panose="02070309020205020404" pitchFamily="49" charset="0"/>
                 <a:cs typeface="Courier New" panose="02070309020205020404" pitchFamily="49" charset="0"/>
               </a:rPr>
-              <a:t>purrr</a:t>
+              <a:t>gpas</a:t>
             </a:r>
             <a:r>
               <a:rPr lang="en-US" dirty="0">
                 <a:latin typeface="Courier New" panose="02070309020205020404" pitchFamily="49" charset="0"/>
                 <a:cs typeface="Courier New" panose="02070309020205020404" pitchFamily="49" charset="0"/>
               </a:rPr>
-              <a:t>::keep(</a:t>
-            </a:r>
-            <a:r>
-              <a:rPr lang="en-US" dirty="0" err="1">
-                <a:latin typeface="Courier New" panose="02070309020205020404" pitchFamily="49" charset="0"/>
-                <a:cs typeface="Courier New" panose="02070309020205020404" pitchFamily="49" charset="0"/>
-              </a:rPr>
-              <a:t>gpas</a:t>
-            </a:r>
-            <a:r>
-              <a:rPr lang="en-US" dirty="0">
-                <a:latin typeface="Courier New" panose="02070309020205020404" pitchFamily="49" charset="0"/>
-                <a:cs typeface="Courier New" panose="02070309020205020404" pitchFamily="49" charset="0"/>
-              </a:rPr>
               <a:t>, ~ .x &gt; 3.8)</a:t>
-            </a:r>
-          </a:p>
-          <a:p>
-            <a:pPr lvl="2"/>
-            <a:r>
-              <a:rPr lang="en-US" dirty="0" err="1">
-                <a:latin typeface="Courier New" panose="02070309020205020404" pitchFamily="49" charset="0"/>
-                <a:cs typeface="Courier New" panose="02070309020205020404" pitchFamily="49" charset="0"/>
-              </a:rPr>
-              <a:t>purrr</a:t>
-            </a:r>
-            <a:r>
-              <a:rPr lang="en-US" dirty="0">
-                <a:latin typeface="Courier New" panose="02070309020205020404" pitchFamily="49" charset="0"/>
-                <a:cs typeface="Courier New" panose="02070309020205020404" pitchFamily="49" charset="0"/>
-              </a:rPr>
-              <a:t>:: </a:t>
-            </a:r>
-            <a:r>
-              <a:rPr lang="en-US" dirty="0">
-                <a:cs typeface="Courier New" panose="02070309020205020404" pitchFamily="49" charset="0"/>
-              </a:rPr>
-              <a:t>means that we’re specifying what package we’re looking in.</a:t>
             </a:r>
           </a:p>
         </p:txBody>
@@ -9416,6 +9387,20 @@
             </a:r>
           </a:p>
           <a:p>
+            <a:pPr lvl="1"/>
+            <a:r>
+              <a:rPr lang="en-US" dirty="0"/>
+              <a:t>Is a condition always true?</a:t>
+            </a:r>
+          </a:p>
+          <a:p>
+            <a:pPr lvl="1"/>
+            <a:r>
+              <a:rPr lang="en-US" dirty="0"/>
+              <a:t>Is a condition ever true?</a:t>
+            </a:r>
+          </a:p>
+          <a:p>
             <a:r>
               <a:rPr lang="en-US" dirty="0"/>
               <a:t>What do you know? Formulas again!</a:t>
@@ -10206,7 +10191,7 @@
           <a:p>
             <a:r>
               <a:rPr lang="en-US" dirty="0"/>
-              <a:t>Ex:</a:t>
+              <a:t>e.g.:</a:t>
             </a:r>
           </a:p>
           <a:p>
@@ -10699,6 +10684,32 @@
               <a:t>Can use multiple column names!</a:t>
             </a:r>
           </a:p>
+          <a:p>
+            <a:r>
+              <a:rPr lang="en-US" dirty="0" err="1">
+                <a:latin typeface="Courier New" panose="02070309020205020404" pitchFamily="49" charset="0"/>
+                <a:cs typeface="Courier New" panose="02070309020205020404" pitchFamily="49" charset="0"/>
+              </a:rPr>
+              <a:t>drop_na</a:t>
+            </a:r>
+            <a:r>
+              <a:rPr lang="en-US" dirty="0">
+                <a:latin typeface="Courier New" panose="02070309020205020404" pitchFamily="49" charset="0"/>
+                <a:cs typeface="Courier New" panose="02070309020205020404" pitchFamily="49" charset="0"/>
+              </a:rPr>
+              <a:t>(): </a:t>
+            </a:r>
+            <a:r>
+              <a:rPr lang="en-US" dirty="0">
+                <a:cs typeface="Courier New" panose="02070309020205020404" pitchFamily="49" charset="0"/>
+              </a:rPr>
+              <a:t>a special case for deleting any row that has a missing value</a:t>
+            </a:r>
+            <a:endParaRPr lang="en-US" dirty="0">
+              <a:latin typeface="Courier New" panose="02070309020205020404" pitchFamily="49" charset="0"/>
+              <a:cs typeface="Courier New" panose="02070309020205020404" pitchFamily="49" charset="0"/>
+            </a:endParaRPr>
+          </a:p>
         </p:txBody>
       </p:sp>
       <p:sp>
@@ -11690,7 +11701,7 @@
           <a:p>
             <a:r>
               <a:rPr lang="en-US" dirty="0"/>
-              <a:t>Combine data from two </a:t>
+              <a:t>Combine data from two different </a:t>
             </a:r>
             <a:r>
               <a:rPr lang="en-US" dirty="0" err="1"/>
@@ -11705,50 +11716,69 @@
             <a:pPr lvl="1"/>
             <a:r>
               <a:rPr lang="en-US" dirty="0"/>
-              <a:t>Must share one column. Specify this as the “by” argument.</a:t>
+              <a:t>Must share one column name. Specify this as the “by” argument.</a:t>
             </a:r>
           </a:p>
           <a:p>
             <a:pPr lvl="1"/>
             <a:r>
               <a:rPr lang="en-US" dirty="0"/>
-              <a:t>Adds columns from both </a:t>
+              <a:t>Inner: keep only rows that are in both</a:t>
+            </a:r>
+          </a:p>
+          <a:p>
+            <a:pPr lvl="1"/>
+            <a:r>
+              <a:rPr lang="en-US" dirty="0"/>
+              <a:t>Left: keep all rows in first </a:t>
             </a:r>
             <a:r>
               <a:rPr lang="en-US" dirty="0" err="1"/>
-              <a:t>tibbles</a:t>
-            </a:r>
-            <a:r>
-              <a:rPr lang="en-US" dirty="0"/>
-              <a:t>!</a:t>
+              <a:t>tibble</a:t>
+            </a:r>
+            <a:r>
+              <a:rPr lang="en-US" dirty="0"/>
+              <a:t>, even if they don’t have a match</a:t>
             </a:r>
           </a:p>
           <a:p>
             <a:pPr lvl="1"/>
             <a:r>
               <a:rPr lang="en-US" dirty="0"/>
-              <a:t>Inner: keep only rows that are in both</a:t>
+              <a:t>Right: keep all rows in second </a:t>
+            </a:r>
+            <a:r>
+              <a:rPr lang="en-US" dirty="0" err="1"/>
+              <a:t>tibble</a:t>
+            </a:r>
+            <a:r>
+              <a:rPr lang="en-US" dirty="0"/>
+              <a:t>, even if they don’t have a match</a:t>
             </a:r>
           </a:p>
           <a:p>
             <a:pPr lvl="1"/>
             <a:r>
               <a:rPr lang="en-US" dirty="0"/>
-              <a:t>Left: keep all in first argument</a:t>
+              <a:t>Full: keep all rows</a:t>
             </a:r>
           </a:p>
           <a:p>
             <a:pPr lvl="1"/>
             <a:r>
               <a:rPr lang="en-US" dirty="0"/>
-              <a:t>Right: keep all rows in second argument</a:t>
-            </a:r>
-          </a:p>
-          <a:p>
-            <a:pPr lvl="1"/>
-            <a:r>
-              <a:rPr lang="en-US" dirty="0"/>
-              <a:t>Outer: keep all rows</a:t>
+              <a:t>Note: if there is no match, </a:t>
+            </a:r>
+            <a:r>
+              <a:rPr lang="en-US" dirty="0">
+                <a:latin typeface="Courier New" panose="02070309020205020404" pitchFamily="49" charset="0"/>
+                <a:cs typeface="Courier New" panose="02070309020205020404" pitchFamily="49" charset="0"/>
+              </a:rPr>
+              <a:t>NA</a:t>
+            </a:r>
+            <a:r>
+              <a:rPr lang="en-US" dirty="0"/>
+              <a:t> is the default!</a:t>
             </a:r>
           </a:p>
           <a:p>
@@ -11805,6 +11835,15 @@
               <a:latin typeface="Courier New" panose="02070309020205020404" pitchFamily="49" charset="0"/>
               <a:cs typeface="Courier New" panose="02070309020205020404" pitchFamily="49" charset="0"/>
             </a:endParaRPr>
+          </a:p>
+          <a:p>
+            <a:r>
+              <a:rPr lang="en-US" dirty="0">
+                <a:latin typeface="Courier New" panose="02070309020205020404" pitchFamily="49" charset="0"/>
+                <a:cs typeface="Courier New" panose="02070309020205020404" pitchFamily="49" charset="0"/>
+              </a:rPr>
+              <a:t>*_join(tbl_1, tbl_2, by=“common column name”)</a:t>
+            </a:r>
           </a:p>
         </p:txBody>
       </p:sp>
@@ -11976,36 +12015,40 @@
           <a:p>
             <a:r>
               <a:rPr lang="en-US" dirty="0"/>
-              <a:t>JOIN / MERGE: VENN DIAGRAMS</a:t>
-            </a:r>
-          </a:p>
-        </p:txBody>
-      </p:sp>
-      <p:sp>
-        <p:nvSpPr>
-          <p:cNvPr id="3" name="Content Placeholder 2">
-            <a:extLst>
-              <a:ext uri="{FF2B5EF4-FFF2-40B4-BE49-F238E27FC236}">
-                <a16:creationId xmlns:a16="http://schemas.microsoft.com/office/drawing/2014/main" id="{AE979079-854B-411C-B824-947E44C14007}"/>
-              </a:ext>
-            </a:extLst>
-          </p:cNvPr>
-          <p:cNvSpPr>
-            <a:spLocks noGrp="1"/>
-          </p:cNvSpPr>
+              <a:t>JOIN / MERGE: VISUALLY</a:t>
+            </a:r>
+          </a:p>
+        </p:txBody>
+      </p:sp>
+      <p:pic>
+        <p:nvPicPr>
+          <p:cNvPr id="8" name="Content Placeholder 7" descr="A drawing of a person&#10;&#10;Description automatically generated">
+            <a:extLst>
+              <a:ext uri="{FF2B5EF4-FFF2-40B4-BE49-F238E27FC236}">
+                <a16:creationId xmlns:a16="http://schemas.microsoft.com/office/drawing/2014/main" id="{4D9A4C85-88E8-41BD-86A1-BFB6FB832F82}"/>
+              </a:ext>
+            </a:extLst>
+          </p:cNvPr>
+          <p:cNvPicPr>
+            <a:picLocks noGrp="1" noChangeAspect="1"/>
+          </p:cNvPicPr>
           <p:nvPr>
             <p:ph idx="1"/>
           </p:nvPr>
-        </p:nvSpPr>
-        <p:spPr/>
-        <p:txBody>
-          <a:bodyPr/>
-          <a:lstStyle/>
-          <a:p>
-            <a:endParaRPr lang="en-US" dirty="0"/>
-          </a:p>
-        </p:txBody>
-      </p:sp>
+        </p:nvPicPr>
+        <p:blipFill>
+          <a:blip r:embed="rId2"/>
+          <a:stretch>
+            <a:fillRect/>
+          </a:stretch>
+        </p:blipFill>
+        <p:spPr>
+          <a:xfrm>
+            <a:off x="838200" y="2690492"/>
+            <a:ext cx="1652600" cy="1000132"/>
+          </a:xfrm>
+        </p:spPr>
+      </p:pic>
       <p:sp>
         <p:nvSpPr>
           <p:cNvPr id="4" name="Date Placeholder 3">
@@ -12121,10 +12164,100 @@
           </a:p>
         </p:txBody>
       </p:sp>
+      <p:pic>
+        <p:nvPicPr>
+          <p:cNvPr id="10" name="Picture 9" descr="A close up of text on a white background&#10;&#10;Description automatically generated">
+            <a:extLst>
+              <a:ext uri="{FF2B5EF4-FFF2-40B4-BE49-F238E27FC236}">
+                <a16:creationId xmlns:a16="http://schemas.microsoft.com/office/drawing/2014/main" id="{3879146D-D34E-4B87-90EB-6923BBA26FBE}"/>
+              </a:ext>
+            </a:extLst>
+          </p:cNvPr>
+          <p:cNvPicPr>
+            <a:picLocks noChangeAspect="1"/>
+          </p:cNvPicPr>
+          <p:nvPr/>
+        </p:nvPicPr>
+        <p:blipFill>
+          <a:blip r:embed="rId3"/>
+          <a:stretch>
+            <a:fillRect/>
+          </a:stretch>
+        </p:blipFill>
+        <p:spPr>
+          <a:xfrm>
+            <a:off x="3229659" y="3092844"/>
+            <a:ext cx="3633814" cy="1728800"/>
+          </a:xfrm>
+          <a:prstGeom prst="rect">
+            <a:avLst/>
+          </a:prstGeom>
+        </p:spPr>
+      </p:pic>
+      <p:pic>
+        <p:nvPicPr>
+          <p:cNvPr id="12" name="Picture 11" descr="A close up of text on a white background&#10;&#10;Description automatically generated">
+            <a:extLst>
+              <a:ext uri="{FF2B5EF4-FFF2-40B4-BE49-F238E27FC236}">
+                <a16:creationId xmlns:a16="http://schemas.microsoft.com/office/drawing/2014/main" id="{37FAB09A-FEF7-4B8B-9594-1A1017665978}"/>
+              </a:ext>
+            </a:extLst>
+          </p:cNvPr>
+          <p:cNvPicPr>
+            <a:picLocks noChangeAspect="1"/>
+          </p:cNvPicPr>
+          <p:nvPr/>
+        </p:nvPicPr>
+        <p:blipFill>
+          <a:blip r:embed="rId4"/>
+          <a:stretch>
+            <a:fillRect/>
+          </a:stretch>
+        </p:blipFill>
+        <p:spPr>
+          <a:xfrm>
+            <a:off x="3089164" y="1581950"/>
+            <a:ext cx="3914804" cy="1409710"/>
+          </a:xfrm>
+          <a:prstGeom prst="rect">
+            <a:avLst/>
+          </a:prstGeom>
+        </p:spPr>
+      </p:pic>
+      <p:pic>
+        <p:nvPicPr>
+          <p:cNvPr id="14" name="Picture 13" descr="A screenshot of a cell phone screen with text&#10;&#10;Description automatically generated">
+            <a:extLst>
+              <a:ext uri="{FF2B5EF4-FFF2-40B4-BE49-F238E27FC236}">
+                <a16:creationId xmlns:a16="http://schemas.microsoft.com/office/drawing/2014/main" id="{B1A0062C-F782-4C95-B94A-C4C2BD46E84E}"/>
+              </a:ext>
+            </a:extLst>
+          </p:cNvPr>
+          <p:cNvPicPr>
+            <a:picLocks noChangeAspect="1"/>
+          </p:cNvPicPr>
+          <p:nvPr/>
+        </p:nvPicPr>
+        <p:blipFill>
+          <a:blip r:embed="rId5"/>
+          <a:stretch>
+            <a:fillRect/>
+          </a:stretch>
+        </p:blipFill>
+        <p:spPr>
+          <a:xfrm>
+            <a:off x="7268654" y="1699885"/>
+            <a:ext cx="3705252" cy="2981347"/>
+          </a:xfrm>
+          <a:prstGeom prst="rect">
+            <a:avLst/>
+          </a:prstGeom>
+        </p:spPr>
+      </p:pic>
     </p:spTree>
     <p:extLst>
       <p:ext uri="{BB962C8B-B14F-4D97-AF65-F5344CB8AC3E}">
-        <p14:creationId xmlns:p14="http://schemas.microsoft.com/office/powerpoint/2010/main" val="1545346064"/>
+        <p14:creationId xmlns:p14="http://schemas.microsoft.com/office/powerpoint/2010/main" val="3953209808"/>
       </p:ext>
     </p:extLst>
   </p:cSld>
@@ -12174,36 +12307,40 @@
           <a:p>
             <a:r>
               <a:rPr lang="en-US" dirty="0"/>
-              <a:t>JOIN / MERGE: MORE PICTURES</a:t>
-            </a:r>
-          </a:p>
-        </p:txBody>
-      </p:sp>
-      <p:sp>
-        <p:nvSpPr>
-          <p:cNvPr id="3" name="Content Placeholder 2">
-            <a:extLst>
-              <a:ext uri="{FF2B5EF4-FFF2-40B4-BE49-F238E27FC236}">
-                <a16:creationId xmlns:a16="http://schemas.microsoft.com/office/drawing/2014/main" id="{AE979079-854B-411C-B824-947E44C14007}"/>
-              </a:ext>
-            </a:extLst>
-          </p:cNvPr>
-          <p:cNvSpPr>
-            <a:spLocks noGrp="1"/>
-          </p:cNvSpPr>
+              <a:t>JOIN / MERGE: VENN DIAGRAMS</a:t>
+            </a:r>
+          </a:p>
+        </p:txBody>
+      </p:sp>
+      <p:pic>
+        <p:nvPicPr>
+          <p:cNvPr id="8" name="Content Placeholder 7" descr="A picture containing sport, athletic game&#10;&#10;Description automatically generated">
+            <a:extLst>
+              <a:ext uri="{FF2B5EF4-FFF2-40B4-BE49-F238E27FC236}">
+                <a16:creationId xmlns:a16="http://schemas.microsoft.com/office/drawing/2014/main" id="{68A34F49-297C-41EF-B8BD-BE720A07D15A}"/>
+              </a:ext>
+            </a:extLst>
+          </p:cNvPr>
+          <p:cNvPicPr>
+            <a:picLocks noGrp="1" noChangeAspect="1"/>
+          </p:cNvPicPr>
           <p:nvPr>
             <p:ph idx="1"/>
           </p:nvPr>
-        </p:nvSpPr>
-        <p:spPr/>
-        <p:txBody>
-          <a:bodyPr/>
-          <a:lstStyle/>
-          <a:p>
-            <a:endParaRPr lang="en-US" dirty="0"/>
-          </a:p>
-        </p:txBody>
-      </p:sp>
+        </p:nvPicPr>
+        <p:blipFill>
+          <a:blip r:embed="rId2"/>
+          <a:stretch>
+            <a:fillRect/>
+          </a:stretch>
+        </p:blipFill>
+        <p:spPr>
+          <a:xfrm>
+            <a:off x="3169422" y="3179756"/>
+            <a:ext cx="5853155" cy="1643075"/>
+          </a:xfrm>
+        </p:spPr>
+      </p:pic>
       <p:sp>
         <p:nvSpPr>
           <p:cNvPr id="4" name="Date Placeholder 3">
@@ -12322,7 +12459,7 @@
     </p:spTree>
     <p:extLst>
       <p:ext uri="{BB962C8B-B14F-4D97-AF65-F5344CB8AC3E}">
-        <p14:creationId xmlns:p14="http://schemas.microsoft.com/office/powerpoint/2010/main" val="3953209808"/>
+        <p14:creationId xmlns:p14="http://schemas.microsoft.com/office/powerpoint/2010/main" val="1545346064"/>
       </p:ext>
     </p:extLst>
   </p:cSld>
@@ -12628,6 +12765,14 @@
               <a:t> worked</a:t>
             </a:r>
           </a:p>
+          <a:p>
+            <a:r>
+              <a:rPr lang="en-US" dirty="0">
+                <a:cs typeface="Courier New" panose="02070309020205020404" pitchFamily="49" charset="0"/>
+              </a:rPr>
+              <a:t>Then, add a different summary function!</a:t>
+            </a:r>
+          </a:p>
         </p:txBody>
       </p:sp>
       <p:sp>
@@ -12929,6 +13074,60 @@
               </a:rPr>
               <a:t>(states, mean)</a:t>
             </a:r>
+          </a:p>
+          <a:p>
+            <a:r>
+              <a:rPr lang="en-US" dirty="0">
+                <a:cs typeface="Courier New" panose="02070309020205020404" pitchFamily="49" charset="0"/>
+              </a:rPr>
+              <a:t>Common grouping operations:</a:t>
+            </a:r>
+          </a:p>
+          <a:p>
+            <a:pPr lvl="1"/>
+            <a:r>
+              <a:rPr lang="en-US" dirty="0" err="1">
+                <a:latin typeface="Courier New" panose="02070309020205020404" pitchFamily="49" charset="0"/>
+                <a:cs typeface="Courier New" panose="02070309020205020404" pitchFamily="49" charset="0"/>
+              </a:rPr>
+              <a:t>n_distinct</a:t>
+            </a:r>
+            <a:r>
+              <a:rPr lang="en-US" dirty="0">
+                <a:latin typeface="Courier New" panose="02070309020205020404" pitchFamily="49" charset="0"/>
+                <a:cs typeface="Courier New" panose="02070309020205020404" pitchFamily="49" charset="0"/>
+              </a:rPr>
+              <a:t> -&gt;</a:t>
+            </a:r>
+            <a:r>
+              <a:rPr lang="en-US" dirty="0">
+                <a:cs typeface="Courier New" panose="02070309020205020404" pitchFamily="49" charset="0"/>
+              </a:rPr>
+              <a:t> number of unique rows</a:t>
+            </a:r>
+          </a:p>
+          <a:p>
+            <a:pPr lvl="1"/>
+            <a:r>
+              <a:rPr lang="en-US" dirty="0">
+                <a:latin typeface="Courier New" panose="02070309020205020404" pitchFamily="49" charset="0"/>
+                <a:cs typeface="Courier New" panose="02070309020205020404" pitchFamily="49" charset="0"/>
+              </a:rPr>
+              <a:t>sum</a:t>
+            </a:r>
+          </a:p>
+          <a:p>
+            <a:pPr lvl="1"/>
+            <a:r>
+              <a:rPr lang="en-US" dirty="0">
+                <a:latin typeface="Courier New" panose="02070309020205020404" pitchFamily="49" charset="0"/>
+                <a:cs typeface="Courier New" panose="02070309020205020404" pitchFamily="49" charset="0"/>
+              </a:rPr>
+              <a:t>min, max</a:t>
+            </a:r>
+          </a:p>
+          <a:p>
+            <a:pPr lvl="1"/>
             <a:endParaRPr lang="en-US" dirty="0"/>
           </a:p>
         </p:txBody>
@@ -14045,6 +14244,66 @@
           </a:p>
         </p:txBody>
       </p:sp>
+      <p:pic>
+        <p:nvPicPr>
+          <p:cNvPr id="8" name="Picture 7" descr="A close up of a white wall&#10;&#10;Description automatically generated">
+            <a:extLst>
+              <a:ext uri="{FF2B5EF4-FFF2-40B4-BE49-F238E27FC236}">
+                <a16:creationId xmlns:a16="http://schemas.microsoft.com/office/drawing/2014/main" id="{7F956898-13F0-4231-95F4-882101C40240}"/>
+              </a:ext>
+            </a:extLst>
+          </p:cNvPr>
+          <p:cNvPicPr>
+            <a:picLocks noChangeAspect="1"/>
+          </p:cNvPicPr>
+          <p:nvPr/>
+        </p:nvPicPr>
+        <p:blipFill>
+          <a:blip r:embed="rId2"/>
+          <a:stretch>
+            <a:fillRect/>
+          </a:stretch>
+        </p:blipFill>
+        <p:spPr>
+          <a:xfrm>
+            <a:off x="1474487" y="3204783"/>
+            <a:ext cx="4358323" cy="2887904"/>
+          </a:xfrm>
+          <a:prstGeom prst="rect">
+            <a:avLst/>
+          </a:prstGeom>
+        </p:spPr>
+      </p:pic>
+      <p:pic>
+        <p:nvPicPr>
+          <p:cNvPr id="10" name="Picture 9">
+            <a:extLst>
+              <a:ext uri="{FF2B5EF4-FFF2-40B4-BE49-F238E27FC236}">
+                <a16:creationId xmlns:a16="http://schemas.microsoft.com/office/drawing/2014/main" id="{181FF408-FB46-4397-A2C3-CBBB9E199695}"/>
+              </a:ext>
+            </a:extLst>
+          </p:cNvPr>
+          <p:cNvPicPr>
+            <a:picLocks noChangeAspect="1"/>
+          </p:cNvPicPr>
+          <p:nvPr/>
+        </p:nvPicPr>
+        <p:blipFill>
+          <a:blip r:embed="rId3"/>
+          <a:stretch>
+            <a:fillRect/>
+          </a:stretch>
+        </p:blipFill>
+        <p:spPr>
+          <a:xfrm>
+            <a:off x="6469096" y="3132968"/>
+            <a:ext cx="4466704" cy="2959719"/>
+          </a:xfrm>
+          <a:prstGeom prst="rect">
+            <a:avLst/>
+          </a:prstGeom>
+        </p:spPr>
+      </p:pic>
     </p:spTree>
     <p:extLst>
       <p:ext uri="{BB962C8B-B14F-4D97-AF65-F5344CB8AC3E}">
@@ -14164,6 +14423,88 @@
               <a:t>y = …, color = …</a:t>
             </a:r>
           </a:p>
+          <a:p>
+            <a:endParaRPr lang="en-US" dirty="0">
+              <a:latin typeface="Courier New" panose="02070309020205020404" pitchFamily="49" charset="0"/>
+              <a:cs typeface="Courier New" panose="02070309020205020404" pitchFamily="49" charset="0"/>
+            </a:endParaRPr>
+          </a:p>
+          <a:p>
+            <a:r>
+              <a:rPr lang="en-US" dirty="0" err="1">
+                <a:latin typeface="Courier New" panose="02070309020205020404" pitchFamily="49" charset="0"/>
+                <a:cs typeface="Courier New" panose="02070309020205020404" pitchFamily="49" charset="0"/>
+              </a:rPr>
+              <a:t>ggplot</a:t>
+            </a:r>
+            <a:r>
+              <a:rPr lang="en-US" dirty="0">
+                <a:latin typeface="Courier New" panose="02070309020205020404" pitchFamily="49" charset="0"/>
+                <a:cs typeface="Courier New" panose="02070309020205020404" pitchFamily="49" charset="0"/>
+              </a:rPr>
+              <a:t>(data = iris, mapping = </a:t>
+            </a:r>
+            <a:r>
+              <a:rPr lang="en-US" dirty="0" err="1">
+                <a:latin typeface="Courier New" panose="02070309020205020404" pitchFamily="49" charset="0"/>
+                <a:cs typeface="Courier New" panose="02070309020205020404" pitchFamily="49" charset="0"/>
+              </a:rPr>
+              <a:t>aes</a:t>
+            </a:r>
+            <a:r>
+              <a:rPr lang="en-US" dirty="0">
+                <a:latin typeface="Courier New" panose="02070309020205020404" pitchFamily="49" charset="0"/>
+                <a:cs typeface="Courier New" panose="02070309020205020404" pitchFamily="49" charset="0"/>
+              </a:rPr>
+              <a:t>(x = </a:t>
+            </a:r>
+            <a:r>
+              <a:rPr lang="en-US" dirty="0" err="1">
+                <a:latin typeface="Courier New" panose="02070309020205020404" pitchFamily="49" charset="0"/>
+                <a:cs typeface="Courier New" panose="02070309020205020404" pitchFamily="49" charset="0"/>
+              </a:rPr>
+              <a:t>Petal.Length</a:t>
+            </a:r>
+            <a:r>
+              <a:rPr lang="en-US" dirty="0">
+                <a:latin typeface="Courier New" panose="02070309020205020404" pitchFamily="49" charset="0"/>
+                <a:cs typeface="Courier New" panose="02070309020205020404" pitchFamily="49" charset="0"/>
+              </a:rPr>
+              <a:t>, y = </a:t>
+            </a:r>
+            <a:r>
+              <a:rPr lang="en-US" dirty="0" err="1">
+                <a:latin typeface="Courier New" panose="02070309020205020404" pitchFamily="49" charset="0"/>
+                <a:cs typeface="Courier New" panose="02070309020205020404" pitchFamily="49" charset="0"/>
+              </a:rPr>
+              <a:t>Petal.Width</a:t>
+            </a:r>
+            <a:r>
+              <a:rPr lang="en-US" dirty="0">
+                <a:latin typeface="Courier New" panose="02070309020205020404" pitchFamily="49" charset="0"/>
+                <a:cs typeface="Courier New" panose="02070309020205020404" pitchFamily="49" charset="0"/>
+              </a:rPr>
+              <a:t>, color = Species))</a:t>
+            </a:r>
+          </a:p>
+          <a:p>
+            <a:pPr lvl="1"/>
+            <a:r>
+              <a:rPr lang="en-US" dirty="0">
+                <a:cs typeface="Courier New" panose="02070309020205020404" pitchFamily="49" charset="0"/>
+              </a:rPr>
+              <a:t>This means we’ve assigned the x value the lengths of the irises’ petals, the y value the widths of the irises’ petals, and the color to the species.</a:t>
+            </a:r>
+          </a:p>
+          <a:p>
+            <a:pPr lvl="1"/>
+            <a:r>
+              <a:rPr lang="en-US" dirty="0">
+                <a:cs typeface="Courier New" panose="02070309020205020404" pitchFamily="49" charset="0"/>
+              </a:rPr>
+              <a:t>Note this doesn’t yet make a plot! We have to specify what to do with our mapping.</a:t>
+            </a:r>
+          </a:p>
         </p:txBody>
       </p:sp>
       <p:sp>
@@ -14426,6 +14767,97 @@
               <a:t>)</a:t>
             </a:r>
           </a:p>
+          <a:p>
+            <a:r>
+              <a:rPr lang="en-US" dirty="0"/>
+              <a:t>e.g.</a:t>
+            </a:r>
+          </a:p>
+          <a:p>
+            <a:pPr lvl="1"/>
+            <a:r>
+              <a:rPr lang="en-US" sz="2000" dirty="0" err="1">
+                <a:latin typeface="Courier New" panose="02070309020205020404" pitchFamily="49" charset="0"/>
+                <a:cs typeface="Courier New" panose="02070309020205020404" pitchFamily="49" charset="0"/>
+              </a:rPr>
+              <a:t>ggplot</a:t>
+            </a:r>
+            <a:r>
+              <a:rPr lang="en-US" sz="2000" dirty="0">
+                <a:latin typeface="Courier New" panose="02070309020205020404" pitchFamily="49" charset="0"/>
+                <a:cs typeface="Courier New" panose="02070309020205020404" pitchFamily="49" charset="0"/>
+              </a:rPr>
+              <a:t>(data = iris) + </a:t>
+            </a:r>
+          </a:p>
+          <a:p>
+            <a:pPr marL="457200" lvl="1" indent="0">
+              <a:buNone/>
+            </a:pPr>
+            <a:r>
+              <a:rPr lang="en-US" sz="2000" dirty="0">
+                <a:latin typeface="Courier New" panose="02070309020205020404" pitchFamily="49" charset="0"/>
+                <a:cs typeface="Courier New" panose="02070309020205020404" pitchFamily="49" charset="0"/>
+              </a:rPr>
+              <a:t>   </a:t>
+            </a:r>
+            <a:r>
+              <a:rPr lang="en-US" sz="2000" dirty="0" err="1">
+                <a:latin typeface="Courier New" panose="02070309020205020404" pitchFamily="49" charset="0"/>
+                <a:cs typeface="Courier New" panose="02070309020205020404" pitchFamily="49" charset="0"/>
+              </a:rPr>
+              <a:t>geom_point</a:t>
+            </a:r>
+            <a:r>
+              <a:rPr lang="en-US" sz="2000" dirty="0">
+                <a:latin typeface="Courier New" panose="02070309020205020404" pitchFamily="49" charset="0"/>
+                <a:cs typeface="Courier New" panose="02070309020205020404" pitchFamily="49" charset="0"/>
+              </a:rPr>
+              <a:t>(mapping = </a:t>
+            </a:r>
+            <a:r>
+              <a:rPr lang="en-US" sz="2000" dirty="0" err="1">
+                <a:latin typeface="Courier New" panose="02070309020205020404" pitchFamily="49" charset="0"/>
+                <a:cs typeface="Courier New" panose="02070309020205020404" pitchFamily="49" charset="0"/>
+              </a:rPr>
+              <a:t>aes</a:t>
+            </a:r>
+            <a:r>
+              <a:rPr lang="en-US" sz="2000" dirty="0">
+                <a:latin typeface="Courier New" panose="02070309020205020404" pitchFamily="49" charset="0"/>
+                <a:cs typeface="Courier New" panose="02070309020205020404" pitchFamily="49" charset="0"/>
+              </a:rPr>
+              <a:t>(x = </a:t>
+            </a:r>
+            <a:r>
+              <a:rPr lang="en-US" sz="2000" dirty="0" err="1">
+                <a:latin typeface="Courier New" panose="02070309020205020404" pitchFamily="49" charset="0"/>
+                <a:cs typeface="Courier New" panose="02070309020205020404" pitchFamily="49" charset="0"/>
+              </a:rPr>
+              <a:t>Petal.Length</a:t>
+            </a:r>
+            <a:r>
+              <a:rPr lang="en-US" sz="2000" dirty="0">
+                <a:latin typeface="Courier New" panose="02070309020205020404" pitchFamily="49" charset="0"/>
+                <a:cs typeface="Courier New" panose="02070309020205020404" pitchFamily="49" charset="0"/>
+              </a:rPr>
+              <a:t>, y = </a:t>
+            </a:r>
+            <a:r>
+              <a:rPr lang="en-US" sz="2000" dirty="0" err="1">
+                <a:latin typeface="Courier New" panose="02070309020205020404" pitchFamily="49" charset="0"/>
+                <a:cs typeface="Courier New" panose="02070309020205020404" pitchFamily="49" charset="0"/>
+              </a:rPr>
+              <a:t>Petal.Width</a:t>
+            </a:r>
+            <a:r>
+              <a:rPr lang="en-US" sz="2000" dirty="0">
+                <a:latin typeface="Courier New" panose="02070309020205020404" pitchFamily="49" charset="0"/>
+                <a:cs typeface="Courier New" panose="02070309020205020404" pitchFamily="49" charset="0"/>
+              </a:rPr>
+              <a:t>))</a:t>
+            </a:r>
+          </a:p>
         </p:txBody>
       </p:sp>
       <p:sp>
@@ -14684,6 +15116,132 @@
               <a:t> as well!</a:t>
             </a:r>
           </a:p>
+          <a:p>
+            <a:endParaRPr lang="en-US" dirty="0"/>
+          </a:p>
+          <a:p>
+            <a:pPr marL="0" indent="0">
+              <a:buNone/>
+            </a:pPr>
+            <a:r>
+              <a:rPr lang="en-US" dirty="0" err="1">
+                <a:latin typeface="Courier New" panose="02070309020205020404" pitchFamily="49" charset="0"/>
+                <a:cs typeface="Courier New" panose="02070309020205020404" pitchFamily="49" charset="0"/>
+              </a:rPr>
+              <a:t>ggplot</a:t>
+            </a:r>
+            <a:r>
+              <a:rPr lang="en-US" dirty="0">
+                <a:latin typeface="Courier New" panose="02070309020205020404" pitchFamily="49" charset="0"/>
+                <a:cs typeface="Courier New" panose="02070309020205020404" pitchFamily="49" charset="0"/>
+              </a:rPr>
+              <a:t>(data = iris) +</a:t>
+            </a:r>
+          </a:p>
+          <a:p>
+            <a:pPr marL="0" indent="0">
+              <a:buNone/>
+            </a:pPr>
+            <a:r>
+              <a:rPr lang="en-US" dirty="0">
+                <a:latin typeface="Courier New" panose="02070309020205020404" pitchFamily="49" charset="0"/>
+                <a:cs typeface="Courier New" panose="02070309020205020404" pitchFamily="49" charset="0"/>
+              </a:rPr>
+              <a:t>  </a:t>
+            </a:r>
+            <a:r>
+              <a:rPr lang="en-US" dirty="0" err="1">
+                <a:latin typeface="Courier New" panose="02070309020205020404" pitchFamily="49" charset="0"/>
+                <a:cs typeface="Courier New" panose="02070309020205020404" pitchFamily="49" charset="0"/>
+              </a:rPr>
+              <a:t>geom_point</a:t>
+            </a:r>
+            <a:r>
+              <a:rPr lang="en-US" dirty="0">
+                <a:latin typeface="Courier New" panose="02070309020205020404" pitchFamily="49" charset="0"/>
+                <a:cs typeface="Courier New" panose="02070309020205020404" pitchFamily="49" charset="0"/>
+              </a:rPr>
+              <a:t>(mapping = </a:t>
+            </a:r>
+            <a:r>
+              <a:rPr lang="en-US" dirty="0" err="1">
+                <a:latin typeface="Courier New" panose="02070309020205020404" pitchFamily="49" charset="0"/>
+                <a:cs typeface="Courier New" panose="02070309020205020404" pitchFamily="49" charset="0"/>
+              </a:rPr>
+              <a:t>aes</a:t>
+            </a:r>
+            <a:r>
+              <a:rPr lang="en-US" dirty="0">
+                <a:latin typeface="Courier New" panose="02070309020205020404" pitchFamily="49" charset="0"/>
+                <a:cs typeface="Courier New" panose="02070309020205020404" pitchFamily="49" charset="0"/>
+              </a:rPr>
+              <a:t>(</a:t>
+            </a:r>
+          </a:p>
+          <a:p>
+            <a:pPr marL="0" indent="0">
+              <a:buNone/>
+            </a:pPr>
+            <a:r>
+              <a:rPr lang="en-US" dirty="0">
+                <a:latin typeface="Courier New" panose="02070309020205020404" pitchFamily="49" charset="0"/>
+                <a:cs typeface="Courier New" panose="02070309020205020404" pitchFamily="49" charset="0"/>
+              </a:rPr>
+              <a:t>      x = </a:t>
+            </a:r>
+            <a:r>
+              <a:rPr lang="en-US" dirty="0" err="1">
+                <a:latin typeface="Courier New" panose="02070309020205020404" pitchFamily="49" charset="0"/>
+                <a:cs typeface="Courier New" panose="02070309020205020404" pitchFamily="49" charset="0"/>
+              </a:rPr>
+              <a:t>Petal.Length</a:t>
+            </a:r>
+            <a:r>
+              <a:rPr lang="en-US" dirty="0">
+                <a:latin typeface="Courier New" panose="02070309020205020404" pitchFamily="49" charset="0"/>
+                <a:cs typeface="Courier New" panose="02070309020205020404" pitchFamily="49" charset="0"/>
+              </a:rPr>
+              <a:t>,</a:t>
+            </a:r>
+          </a:p>
+          <a:p>
+            <a:pPr marL="0" indent="0">
+              <a:buNone/>
+            </a:pPr>
+            <a:r>
+              <a:rPr lang="en-US" dirty="0">
+                <a:latin typeface="Courier New" panose="02070309020205020404" pitchFamily="49" charset="0"/>
+                <a:cs typeface="Courier New" panose="02070309020205020404" pitchFamily="49" charset="0"/>
+              </a:rPr>
+              <a:t>      y = </a:t>
+            </a:r>
+            <a:r>
+              <a:rPr lang="en-US" dirty="0" err="1">
+                <a:latin typeface="Courier New" panose="02070309020205020404" pitchFamily="49" charset="0"/>
+                <a:cs typeface="Courier New" panose="02070309020205020404" pitchFamily="49" charset="0"/>
+              </a:rPr>
+              <a:t>Petal.Width</a:t>
+            </a:r>
+            <a:r>
+              <a:rPr lang="en-US" dirty="0">
+                <a:latin typeface="Courier New" panose="02070309020205020404" pitchFamily="49" charset="0"/>
+                <a:cs typeface="Courier New" panose="02070309020205020404" pitchFamily="49" charset="0"/>
+              </a:rPr>
+              <a:t>,</a:t>
+            </a:r>
+          </a:p>
+          <a:p>
+            <a:pPr marL="0" indent="0">
+              <a:buNone/>
+            </a:pPr>
+            <a:r>
+              <a:rPr lang="en-US" dirty="0">
+                <a:latin typeface="Courier New" panose="02070309020205020404" pitchFamily="49" charset="0"/>
+                <a:cs typeface="Courier New" panose="02070309020205020404" pitchFamily="49" charset="0"/>
+              </a:rPr>
+              <a:t>      color = Species))</a:t>
+            </a:r>
+          </a:p>
         </p:txBody>
       </p:sp>
       <p:sp>
@@ -14801,6 +15359,36 @@
           </a:p>
         </p:txBody>
       </p:sp>
+      <p:pic>
+        <p:nvPicPr>
+          <p:cNvPr id="8" name="Picture 7" descr="A screenshot of a cell phone&#10;&#10;Description automatically generated">
+            <a:extLst>
+              <a:ext uri="{FF2B5EF4-FFF2-40B4-BE49-F238E27FC236}">
+                <a16:creationId xmlns:a16="http://schemas.microsoft.com/office/drawing/2014/main" id="{9A95E80F-59EC-415C-8CD5-ED71EBF91F41}"/>
+              </a:ext>
+            </a:extLst>
+          </p:cNvPr>
+          <p:cNvPicPr>
+            <a:picLocks noChangeAspect="1"/>
+          </p:cNvPicPr>
+          <p:nvPr/>
+        </p:nvPicPr>
+        <p:blipFill>
+          <a:blip r:embed="rId2"/>
+          <a:stretch>
+            <a:fillRect/>
+          </a:stretch>
+        </p:blipFill>
+        <p:spPr>
+          <a:xfrm>
+            <a:off x="6820443" y="2752609"/>
+            <a:ext cx="5371557" cy="3559291"/>
+          </a:xfrm>
+          <a:prstGeom prst="rect">
+            <a:avLst/>
+          </a:prstGeom>
+        </p:spPr>
+      </p:pic>
     </p:spTree>
     <p:extLst>
       <p:ext uri="{BB962C8B-B14F-4D97-AF65-F5344CB8AC3E}">
@@ -14877,7 +15465,9 @@
         </p:nvSpPr>
         <p:spPr/>
         <p:txBody>
-          <a:bodyPr/>
+          <a:bodyPr>
+            <a:normAutofit lnSpcReduction="10000"/>
+          </a:bodyPr>
           <a:lstStyle/>
           <a:p>
             <a:r>
@@ -14918,6 +15508,127 @@
             <a:r>
               <a:rPr lang="en-US" dirty="0"/>
               <a:t> mapping.</a:t>
+            </a:r>
+          </a:p>
+          <a:p>
+            <a:endParaRPr lang="en-US" dirty="0"/>
+          </a:p>
+          <a:p>
+            <a:pPr marL="0" indent="0">
+              <a:buNone/>
+            </a:pPr>
+            <a:r>
+              <a:rPr lang="en-US" dirty="0" err="1">
+                <a:latin typeface="Courier New" panose="02070309020205020404" pitchFamily="49" charset="0"/>
+                <a:cs typeface="Courier New" panose="02070309020205020404" pitchFamily="49" charset="0"/>
+              </a:rPr>
+              <a:t>ggplot</a:t>
+            </a:r>
+            <a:r>
+              <a:rPr lang="en-US" dirty="0">
+                <a:latin typeface="Courier New" panose="02070309020205020404" pitchFamily="49" charset="0"/>
+                <a:cs typeface="Courier New" panose="02070309020205020404" pitchFamily="49" charset="0"/>
+              </a:rPr>
+              <a:t>(data = iris) +</a:t>
+            </a:r>
+          </a:p>
+          <a:p>
+            <a:pPr marL="0" indent="0">
+              <a:buNone/>
+            </a:pPr>
+            <a:r>
+              <a:rPr lang="en-US" dirty="0">
+                <a:latin typeface="Courier New" panose="02070309020205020404" pitchFamily="49" charset="0"/>
+                <a:cs typeface="Courier New" panose="02070309020205020404" pitchFamily="49" charset="0"/>
+              </a:rPr>
+              <a:t>  </a:t>
+            </a:r>
+            <a:r>
+              <a:rPr lang="en-US" dirty="0" err="1">
+                <a:latin typeface="Courier New" panose="02070309020205020404" pitchFamily="49" charset="0"/>
+                <a:cs typeface="Courier New" panose="02070309020205020404" pitchFamily="49" charset="0"/>
+              </a:rPr>
+              <a:t>geom_boxplot</a:t>
+            </a:r>
+            <a:r>
+              <a:rPr lang="en-US" dirty="0">
+                <a:latin typeface="Courier New" panose="02070309020205020404" pitchFamily="49" charset="0"/>
+                <a:cs typeface="Courier New" panose="02070309020205020404" pitchFamily="49" charset="0"/>
+              </a:rPr>
+              <a:t>(</a:t>
+            </a:r>
+          </a:p>
+          <a:p>
+            <a:pPr marL="0" indent="0">
+              <a:buNone/>
+            </a:pPr>
+            <a:r>
+              <a:rPr lang="en-US" dirty="0">
+                <a:latin typeface="Courier New" panose="02070309020205020404" pitchFamily="49" charset="0"/>
+                <a:cs typeface="Courier New" panose="02070309020205020404" pitchFamily="49" charset="0"/>
+              </a:rPr>
+              <a:t>    mapping = </a:t>
+            </a:r>
+            <a:r>
+              <a:rPr lang="en-US" dirty="0" err="1">
+                <a:latin typeface="Courier New" panose="02070309020205020404" pitchFamily="49" charset="0"/>
+                <a:cs typeface="Courier New" panose="02070309020205020404" pitchFamily="49" charset="0"/>
+              </a:rPr>
+              <a:t>aes</a:t>
+            </a:r>
+            <a:r>
+              <a:rPr lang="en-US" dirty="0">
+                <a:latin typeface="Courier New" panose="02070309020205020404" pitchFamily="49" charset="0"/>
+                <a:cs typeface="Courier New" panose="02070309020205020404" pitchFamily="49" charset="0"/>
+              </a:rPr>
+              <a:t>(</a:t>
+            </a:r>
+          </a:p>
+          <a:p>
+            <a:pPr marL="0" indent="0">
+              <a:buNone/>
+            </a:pPr>
+            <a:r>
+              <a:rPr lang="en-US" dirty="0">
+                <a:latin typeface="Courier New" panose="02070309020205020404" pitchFamily="49" charset="0"/>
+                <a:cs typeface="Courier New" panose="02070309020205020404" pitchFamily="49" charset="0"/>
+              </a:rPr>
+              <a:t>      y = </a:t>
+            </a:r>
+            <a:r>
+              <a:rPr lang="en-US" dirty="0" err="1">
+                <a:latin typeface="Courier New" panose="02070309020205020404" pitchFamily="49" charset="0"/>
+                <a:cs typeface="Courier New" panose="02070309020205020404" pitchFamily="49" charset="0"/>
+              </a:rPr>
+              <a:t>Petal.Length</a:t>
+            </a:r>
+            <a:endParaRPr lang="en-US" dirty="0">
+              <a:latin typeface="Courier New" panose="02070309020205020404" pitchFamily="49" charset="0"/>
+              <a:cs typeface="Courier New" panose="02070309020205020404" pitchFamily="49" charset="0"/>
+            </a:endParaRPr>
+          </a:p>
+          <a:p>
+            <a:pPr marL="0" indent="0">
+              <a:buNone/>
+            </a:pPr>
+            <a:r>
+              <a:rPr lang="en-US" dirty="0">
+                <a:latin typeface="Courier New" panose="02070309020205020404" pitchFamily="49" charset="0"/>
+                <a:cs typeface="Courier New" panose="02070309020205020404" pitchFamily="49" charset="0"/>
+              </a:rPr>
+              <a:t>  )</a:t>
+            </a:r>
+          </a:p>
+          <a:p>
+            <a:pPr marL="0" indent="0">
+              <a:buNone/>
+            </a:pPr>
+            <a:r>
+              <a:rPr lang="en-US" dirty="0">
+                <a:latin typeface="Courier New" panose="02070309020205020404" pitchFamily="49" charset="0"/>
+                <a:cs typeface="Courier New" panose="02070309020205020404" pitchFamily="49" charset="0"/>
+              </a:rPr>
+              <a:t>)</a:t>
             </a:r>
           </a:p>
         </p:txBody>
@@ -15037,6 +15748,36 @@
           </a:p>
         </p:txBody>
       </p:sp>
+      <p:pic>
+        <p:nvPicPr>
+          <p:cNvPr id="8" name="Picture 7" descr="A screenshot of a social media post&#10;&#10;Description automatically generated">
+            <a:extLst>
+              <a:ext uri="{FF2B5EF4-FFF2-40B4-BE49-F238E27FC236}">
+                <a16:creationId xmlns:a16="http://schemas.microsoft.com/office/drawing/2014/main" id="{95B20258-22BA-49ED-9EED-CBF6D95EF70F}"/>
+              </a:ext>
+            </a:extLst>
+          </p:cNvPr>
+          <p:cNvPicPr>
+            <a:picLocks noChangeAspect="1"/>
+          </p:cNvPicPr>
+          <p:nvPr/>
+        </p:nvPicPr>
+        <p:blipFill>
+          <a:blip r:embed="rId2"/>
+          <a:stretch>
+            <a:fillRect/>
+          </a:stretch>
+        </p:blipFill>
+        <p:spPr>
+          <a:xfrm>
+            <a:off x="6380921" y="2400741"/>
+            <a:ext cx="5411313" cy="3585634"/>
+          </a:xfrm>
+          <a:prstGeom prst="rect">
+            <a:avLst/>
+          </a:prstGeom>
+        </p:spPr>
+      </p:pic>
     </p:spTree>
     <p:extLst>
       <p:ext uri="{BB962C8B-B14F-4D97-AF65-F5344CB8AC3E}">
@@ -15252,6 +15993,36 @@
           </a:p>
         </p:txBody>
       </p:sp>
+      <p:pic>
+        <p:nvPicPr>
+          <p:cNvPr id="8" name="Picture 7" descr="A screenshot of a cell phone&#10;&#10;Description automatically generated">
+            <a:extLst>
+              <a:ext uri="{FF2B5EF4-FFF2-40B4-BE49-F238E27FC236}">
+                <a16:creationId xmlns:a16="http://schemas.microsoft.com/office/drawing/2014/main" id="{A69EB3EF-D377-4510-9979-A0B7EC95E9BA}"/>
+              </a:ext>
+            </a:extLst>
+          </p:cNvPr>
+          <p:cNvPicPr>
+            <a:picLocks noChangeAspect="1"/>
+          </p:cNvPicPr>
+          <p:nvPr/>
+        </p:nvPicPr>
+        <p:blipFill>
+          <a:blip r:embed="rId2"/>
+          <a:stretch>
+            <a:fillRect/>
+          </a:stretch>
+        </p:blipFill>
+        <p:spPr>
+          <a:xfrm>
+            <a:off x="2409798" y="3906692"/>
+            <a:ext cx="7372404" cy="2085990"/>
+          </a:xfrm>
+          <a:prstGeom prst="rect">
+            <a:avLst/>
+          </a:prstGeom>
+        </p:spPr>
+      </p:pic>
     </p:spTree>
     <p:extLst>
       <p:ext uri="{BB962C8B-B14F-4D97-AF65-F5344CB8AC3E}">
@@ -15488,6 +16259,164 @@
           </a:p>
         </p:txBody>
       </p:sp>
+      <p:sp>
+        <p:nvSpPr>
+          <p:cNvPr id="7" name="Rectangle 6">
+            <a:extLst>
+              <a:ext uri="{FF2B5EF4-FFF2-40B4-BE49-F238E27FC236}">
+                <a16:creationId xmlns:a16="http://schemas.microsoft.com/office/drawing/2014/main" id="{B922F095-C5E7-4646-A762-AB3299A031CD}"/>
+              </a:ext>
+            </a:extLst>
+          </p:cNvPr>
+          <p:cNvSpPr/>
+          <p:nvPr/>
+        </p:nvSpPr>
+        <p:spPr>
+          <a:xfrm>
+            <a:off x="1030357" y="3635168"/>
+            <a:ext cx="6096000" cy="1754326"/>
+          </a:xfrm>
+          <a:prstGeom prst="rect">
+            <a:avLst/>
+          </a:prstGeom>
+        </p:spPr>
+        <p:txBody>
+          <a:bodyPr>
+            <a:spAutoFit/>
+          </a:bodyPr>
+          <a:lstStyle/>
+          <a:p>
+            <a:r>
+              <a:rPr lang="en-US" dirty="0" err="1">
+                <a:latin typeface="Courier New" panose="02070309020205020404" pitchFamily="49" charset="0"/>
+                <a:cs typeface="Courier New" panose="02070309020205020404" pitchFamily="49" charset="0"/>
+              </a:rPr>
+              <a:t>ggplot</a:t>
+            </a:r>
+            <a:r>
+              <a:rPr lang="en-US" dirty="0">
+                <a:latin typeface="Courier New" panose="02070309020205020404" pitchFamily="49" charset="0"/>
+                <a:cs typeface="Courier New" panose="02070309020205020404" pitchFamily="49" charset="0"/>
+              </a:rPr>
+              <a:t>(data = iris) +</a:t>
+            </a:r>
+          </a:p>
+          <a:p>
+            <a:r>
+              <a:rPr lang="en-US" dirty="0">
+                <a:latin typeface="Courier New" panose="02070309020205020404" pitchFamily="49" charset="0"/>
+                <a:cs typeface="Courier New" panose="02070309020205020404" pitchFamily="49" charset="0"/>
+              </a:rPr>
+              <a:t>  </a:t>
+            </a:r>
+            <a:r>
+              <a:rPr lang="en-US" dirty="0" err="1">
+                <a:latin typeface="Courier New" panose="02070309020205020404" pitchFamily="49" charset="0"/>
+                <a:cs typeface="Courier New" panose="02070309020205020404" pitchFamily="49" charset="0"/>
+              </a:rPr>
+              <a:t>geom_histogram</a:t>
+            </a:r>
+            <a:r>
+              <a:rPr lang="en-US" dirty="0">
+                <a:latin typeface="Courier New" panose="02070309020205020404" pitchFamily="49" charset="0"/>
+                <a:cs typeface="Courier New" panose="02070309020205020404" pitchFamily="49" charset="0"/>
+              </a:rPr>
+              <a:t>(</a:t>
+            </a:r>
+          </a:p>
+          <a:p>
+            <a:r>
+              <a:rPr lang="en-US" dirty="0">
+                <a:latin typeface="Courier New" panose="02070309020205020404" pitchFamily="49" charset="0"/>
+                <a:cs typeface="Courier New" panose="02070309020205020404" pitchFamily="49" charset="0"/>
+              </a:rPr>
+              <a:t>    mapping = </a:t>
+            </a:r>
+            <a:r>
+              <a:rPr lang="en-US" dirty="0" err="1">
+                <a:latin typeface="Courier New" panose="02070309020205020404" pitchFamily="49" charset="0"/>
+                <a:cs typeface="Courier New" panose="02070309020205020404" pitchFamily="49" charset="0"/>
+              </a:rPr>
+              <a:t>aes</a:t>
+            </a:r>
+            <a:r>
+              <a:rPr lang="en-US" dirty="0">
+                <a:latin typeface="Courier New" panose="02070309020205020404" pitchFamily="49" charset="0"/>
+                <a:cs typeface="Courier New" panose="02070309020205020404" pitchFamily="49" charset="0"/>
+              </a:rPr>
+              <a:t>(</a:t>
+            </a:r>
+          </a:p>
+          <a:p>
+            <a:r>
+              <a:rPr lang="en-US" dirty="0">
+                <a:latin typeface="Courier New" panose="02070309020205020404" pitchFamily="49" charset="0"/>
+                <a:cs typeface="Courier New" panose="02070309020205020404" pitchFamily="49" charset="0"/>
+              </a:rPr>
+              <a:t>      x = </a:t>
+            </a:r>
+            <a:r>
+              <a:rPr lang="en-US" dirty="0" err="1">
+                <a:latin typeface="Courier New" panose="02070309020205020404" pitchFamily="49" charset="0"/>
+                <a:cs typeface="Courier New" panose="02070309020205020404" pitchFamily="49" charset="0"/>
+              </a:rPr>
+              <a:t>Petal.Length</a:t>
+            </a:r>
+            <a:endParaRPr lang="en-US" dirty="0">
+              <a:latin typeface="Courier New" panose="02070309020205020404" pitchFamily="49" charset="0"/>
+              <a:cs typeface="Courier New" panose="02070309020205020404" pitchFamily="49" charset="0"/>
+            </a:endParaRPr>
+          </a:p>
+          <a:p>
+            <a:r>
+              <a:rPr lang="en-US" dirty="0">
+                <a:latin typeface="Courier New" panose="02070309020205020404" pitchFamily="49" charset="0"/>
+                <a:cs typeface="Courier New" panose="02070309020205020404" pitchFamily="49" charset="0"/>
+              </a:rPr>
+              <a:t>  )</a:t>
+            </a:r>
+          </a:p>
+          <a:p>
+            <a:r>
+              <a:rPr lang="en-US" dirty="0">
+                <a:latin typeface="Courier New" panose="02070309020205020404" pitchFamily="49" charset="0"/>
+                <a:cs typeface="Courier New" panose="02070309020205020404" pitchFamily="49" charset="0"/>
+              </a:rPr>
+              <a:t>)</a:t>
+            </a:r>
+          </a:p>
+        </p:txBody>
+      </p:sp>
+      <p:pic>
+        <p:nvPicPr>
+          <p:cNvPr id="9" name="Picture 8">
+            <a:extLst>
+              <a:ext uri="{FF2B5EF4-FFF2-40B4-BE49-F238E27FC236}">
+                <a16:creationId xmlns:a16="http://schemas.microsoft.com/office/drawing/2014/main" id="{74FE7497-F544-4F25-9571-3F4F0BCE5881}"/>
+              </a:ext>
+            </a:extLst>
+          </p:cNvPr>
+          <p:cNvPicPr>
+            <a:picLocks noChangeAspect="1"/>
+          </p:cNvPicPr>
+          <p:nvPr/>
+        </p:nvPicPr>
+        <p:blipFill>
+          <a:blip r:embed="rId2"/>
+          <a:stretch>
+            <a:fillRect/>
+          </a:stretch>
+        </p:blipFill>
+        <p:spPr>
+          <a:xfrm>
+            <a:off x="6040778" y="2664803"/>
+            <a:ext cx="5139644" cy="3405621"/>
+          </a:xfrm>
+          <a:prstGeom prst="rect">
+            <a:avLst/>
+          </a:prstGeom>
+        </p:spPr>
+      </p:pic>
     </p:spTree>
     <p:extLst>
       <p:ext uri="{BB962C8B-B14F-4D97-AF65-F5344CB8AC3E}">
@@ -15523,7 +16452,7 @@
           <p:cNvPr id="2" name="Title 1">
             <a:extLst>
               <a:ext uri="{FF2B5EF4-FFF2-40B4-BE49-F238E27FC236}">
-                <a16:creationId xmlns:a16="http://schemas.microsoft.com/office/drawing/2014/main" id="{E850068E-C01E-4BED-AF24-C2E9D57DABAC}"/>
+                <a16:creationId xmlns:a16="http://schemas.microsoft.com/office/drawing/2014/main" id="{90949A2E-AE39-4CCA-B55F-42F285F22D3C}"/>
               </a:ext>
             </a:extLst>
           </p:cNvPr>
@@ -15541,7 +16470,7 @@
           <a:p>
             <a:r>
               <a:rPr lang="en-US" dirty="0"/>
-              <a:t>COLORS</a:t>
+              <a:t>PLOTS (GEOMS): BARCHARTS</a:t>
             </a:r>
           </a:p>
         </p:txBody>
@@ -15551,7 +16480,7 @@
           <p:cNvPr id="3" name="Content Placeholder 2">
             <a:extLst>
               <a:ext uri="{FF2B5EF4-FFF2-40B4-BE49-F238E27FC236}">
-                <a16:creationId xmlns:a16="http://schemas.microsoft.com/office/drawing/2014/main" id="{37E146B7-6BDE-4F21-A09D-FE7EF30B6C00}"/>
+                <a16:creationId xmlns:a16="http://schemas.microsoft.com/office/drawing/2014/main" id="{0F728FFC-928C-48A4-B460-584EF7C0D4FF}"/>
               </a:ext>
             </a:extLst>
           </p:cNvPr>
@@ -15562,141 +16491,120 @@
             <p:ph idx="1"/>
           </p:nvPr>
         </p:nvSpPr>
-        <p:spPr/>
-        <p:txBody>
-          <a:bodyPr/>
-          <a:lstStyle/>
-          <a:p>
-            <a:r>
-              <a:rPr lang="en-US" dirty="0"/>
-              <a:t>You can color points two ways to get a ‘third dimension’ on your plots:</a:t>
+        <p:spPr>
+          <a:xfrm>
+            <a:off x="838200" y="1825625"/>
+            <a:ext cx="5155096" cy="4351338"/>
+          </a:xfrm>
+        </p:spPr>
+        <p:txBody>
+          <a:bodyPr>
+            <a:normAutofit lnSpcReduction="10000"/>
+          </a:bodyPr>
+          <a:lstStyle/>
+          <a:p>
+            <a:r>
+              <a:rPr lang="en-US" dirty="0"/>
+              <a:t>Bar charts have categorical data on the x-axis, and some value on the y-axis.</a:t>
+            </a:r>
+          </a:p>
+          <a:p>
+            <a:r>
+              <a:rPr lang="en-US" dirty="0"/>
+              <a:t>Use </a:t>
+            </a:r>
+            <a:r>
+              <a:rPr lang="en-US" dirty="0" err="1">
+                <a:latin typeface="Courier New" panose="02070309020205020404" pitchFamily="49" charset="0"/>
+                <a:cs typeface="Courier New" panose="02070309020205020404" pitchFamily="49" charset="0"/>
+              </a:rPr>
+              <a:t>geom_col</a:t>
+            </a:r>
+            <a:r>
+              <a:rPr lang="en-US" dirty="0">
+                <a:latin typeface="Courier New" panose="02070309020205020404" pitchFamily="49" charset="0"/>
+                <a:cs typeface="Courier New" panose="02070309020205020404" pitchFamily="49" charset="0"/>
+              </a:rPr>
+              <a:t>() </a:t>
+            </a:r>
+            <a:r>
+              <a:rPr lang="en-US" dirty="0"/>
+              <a:t>with appropriate </a:t>
+            </a:r>
+            <a:r>
+              <a:rPr lang="en-US" dirty="0" err="1">
+                <a:latin typeface="Courier New" panose="02070309020205020404" pitchFamily="49" charset="0"/>
+                <a:cs typeface="Courier New" panose="02070309020205020404" pitchFamily="49" charset="0"/>
+              </a:rPr>
+              <a:t>aes</a:t>
+            </a:r>
+            <a:r>
+              <a:rPr lang="en-US" dirty="0"/>
+              <a:t> mapping</a:t>
+            </a:r>
+          </a:p>
+          <a:p>
+            <a:r>
+              <a:rPr lang="en-US" dirty="0"/>
+              <a:t>For discrete data, especially for bar charts, you might want to rotate your axis labels!</a:t>
             </a:r>
           </a:p>
           <a:p>
             <a:pPr lvl="1"/>
             <a:r>
-              <a:rPr lang="en-US" dirty="0"/>
-              <a:t>Continuous: </a:t>
-            </a:r>
-            <a:r>
-              <a:rPr lang="en-US" sz="2800" dirty="0">
-                <a:latin typeface="Courier New" panose="02070309020205020404" pitchFamily="49" charset="0"/>
-                <a:cs typeface="Courier New" panose="02070309020205020404" pitchFamily="49" charset="0"/>
-              </a:rPr>
-              <a:t>color</a:t>
-            </a:r>
-            <a:r>
-              <a:rPr lang="en-US" dirty="0"/>
-              <a:t> </a:t>
-            </a:r>
-            <a:r>
-              <a:rPr lang="en-US" sz="2800" dirty="0">
-                <a:latin typeface="Courier New" panose="02070309020205020404" pitchFamily="49" charset="0"/>
-                <a:cs typeface="Courier New" panose="02070309020205020404" pitchFamily="49" charset="0"/>
-              </a:rPr>
-              <a:t>=</a:t>
-            </a:r>
-            <a:r>
-              <a:rPr lang="en-US" dirty="0"/>
-              <a:t> “</a:t>
-            </a:r>
-            <a:r>
-              <a:rPr lang="en-US" sz="2800" dirty="0">
-                <a:latin typeface="Courier New" panose="02070309020205020404" pitchFamily="49" charset="0"/>
-                <a:cs typeface="Courier New" panose="02070309020205020404" pitchFamily="49" charset="0"/>
-              </a:rPr>
-              <a:t>column</a:t>
-            </a:r>
-            <a:r>
-              <a:rPr lang="en-US" dirty="0"/>
-              <a:t>”, then add a color scale with </a:t>
-            </a:r>
-            <a:r>
-              <a:rPr lang="en-US" sz="2800" dirty="0" err="1">
-                <a:latin typeface="Courier New" panose="02070309020205020404" pitchFamily="49" charset="0"/>
-                <a:cs typeface="Courier New" panose="02070309020205020404" pitchFamily="49" charset="0"/>
-              </a:rPr>
-              <a:t>scale</a:t>
-            </a:r>
-            <a:r>
-              <a:rPr lang="en-US" dirty="0" err="1"/>
-              <a:t>_</a:t>
-            </a:r>
-            <a:r>
-              <a:rPr lang="en-US" sz="2800" dirty="0" err="1">
-                <a:latin typeface="Courier New" panose="02070309020205020404" pitchFamily="49" charset="0"/>
-                <a:cs typeface="Courier New" panose="02070309020205020404" pitchFamily="49" charset="0"/>
-              </a:rPr>
-              <a:t>color</a:t>
-            </a:r>
-            <a:r>
-              <a:rPr lang="en-US" dirty="0" err="1"/>
-              <a:t>_</a:t>
-            </a:r>
-            <a:r>
-              <a:rPr lang="en-US" sz="2800" dirty="0" err="1">
-                <a:latin typeface="Courier New" panose="02070309020205020404" pitchFamily="49" charset="0"/>
-                <a:cs typeface="Courier New" panose="02070309020205020404" pitchFamily="49" charset="0"/>
-              </a:rPr>
-              <a:t>viridis</a:t>
-            </a:r>
-            <a:r>
-              <a:rPr lang="en-US" sz="2800" dirty="0">
-                <a:latin typeface="Courier New" panose="02070309020205020404" pitchFamily="49" charset="0"/>
-                <a:cs typeface="Courier New" panose="02070309020205020404" pitchFamily="49" charset="0"/>
-              </a:rPr>
-              <a:t>()</a:t>
-            </a:r>
-            <a:r>
-              <a:rPr lang="en-US" dirty="0"/>
-              <a:t> or something similar</a:t>
-            </a:r>
-          </a:p>
-          <a:p>
-            <a:pPr lvl="1"/>
-            <a:r>
-              <a:rPr lang="en-US" dirty="0"/>
-              <a:t>Discrete: </a:t>
-            </a:r>
-            <a:r>
-              <a:rPr lang="en-US" sz="2800" dirty="0">
-                <a:latin typeface="Courier New" panose="02070309020205020404" pitchFamily="49" charset="0"/>
-                <a:cs typeface="Courier New" panose="02070309020205020404" pitchFamily="49" charset="0"/>
-              </a:rPr>
-              <a:t>color</a:t>
-            </a:r>
-            <a:r>
-              <a:rPr lang="en-US" dirty="0"/>
-              <a:t> = “</a:t>
-            </a:r>
-            <a:r>
-              <a:rPr lang="en-US" sz="2800" dirty="0">
-                <a:latin typeface="Courier New" panose="02070309020205020404" pitchFamily="49" charset="0"/>
-                <a:cs typeface="Courier New" panose="02070309020205020404" pitchFamily="49" charset="0"/>
-              </a:rPr>
-              <a:t>column</a:t>
-            </a:r>
-            <a:r>
-              <a:rPr lang="en-US" dirty="0"/>
-              <a:t>” in </a:t>
-            </a:r>
-            <a:r>
-              <a:rPr lang="en-US" sz="2800" dirty="0" err="1">
-                <a:latin typeface="Courier New" panose="02070309020205020404" pitchFamily="49" charset="0"/>
-                <a:cs typeface="Courier New" panose="02070309020205020404" pitchFamily="49" charset="0"/>
-              </a:rPr>
-              <a:t>aes</a:t>
-            </a:r>
-            <a:r>
-              <a:rPr lang="en-US" sz="2800" dirty="0">
-                <a:latin typeface="Courier New" panose="02070309020205020404" pitchFamily="49" charset="0"/>
-                <a:cs typeface="Courier New" panose="02070309020205020404" pitchFamily="49" charset="0"/>
-              </a:rPr>
-              <a:t>()</a:t>
-            </a:r>
-          </a:p>
-          <a:p>
-            <a:pPr lvl="1"/>
+              <a:rPr lang="en-US" dirty="0">
+                <a:latin typeface="Courier New" panose="02070309020205020404" pitchFamily="49" charset="0"/>
+                <a:cs typeface="Courier New" panose="02070309020205020404" pitchFamily="49" charset="0"/>
+              </a:rPr>
+              <a:t>theme(</a:t>
+            </a:r>
+            <a:r>
+              <a:rPr lang="en-US" dirty="0" err="1">
+                <a:latin typeface="Courier New" panose="02070309020205020404" pitchFamily="49" charset="0"/>
+                <a:cs typeface="Courier New" panose="02070309020205020404" pitchFamily="49" charset="0"/>
+              </a:rPr>
+              <a:t>axis.text.x</a:t>
+            </a:r>
+            <a:r>
+              <a:rPr lang="en-US" dirty="0">
+                <a:latin typeface="Courier New" panose="02070309020205020404" pitchFamily="49" charset="0"/>
+                <a:cs typeface="Courier New" panose="02070309020205020404" pitchFamily="49" charset="0"/>
+              </a:rPr>
+              <a:t> = </a:t>
+            </a:r>
+            <a:r>
+              <a:rPr lang="en-US" dirty="0" err="1">
+                <a:latin typeface="Courier New" panose="02070309020205020404" pitchFamily="49" charset="0"/>
+                <a:cs typeface="Courier New" panose="02070309020205020404" pitchFamily="49" charset="0"/>
+              </a:rPr>
+              <a:t>element_text</a:t>
+            </a:r>
+            <a:r>
+              <a:rPr lang="en-US" dirty="0">
+                <a:latin typeface="Courier New" panose="02070309020205020404" pitchFamily="49" charset="0"/>
+                <a:cs typeface="Courier New" panose="02070309020205020404" pitchFamily="49" charset="0"/>
+              </a:rPr>
+              <a:t>(angle  = 90, </a:t>
+            </a:r>
+            <a:r>
+              <a:rPr lang="en-US" dirty="0" err="1">
+                <a:latin typeface="Courier New" panose="02070309020205020404" pitchFamily="49" charset="0"/>
+                <a:cs typeface="Courier New" panose="02070309020205020404" pitchFamily="49" charset="0"/>
+              </a:rPr>
+              <a:t>hjust</a:t>
+            </a:r>
+            <a:r>
+              <a:rPr lang="en-US" dirty="0">
+                <a:latin typeface="Courier New" panose="02070309020205020404" pitchFamily="49" charset="0"/>
+                <a:cs typeface="Courier New" panose="02070309020205020404" pitchFamily="49" charset="0"/>
+              </a:rPr>
+              <a:t> = 1))</a:t>
+            </a:r>
+          </a:p>
+          <a:p>
+            <a:pPr marL="0" indent="0">
+              <a:buNone/>
+            </a:pPr>
             <a:endParaRPr lang="en-US" dirty="0"/>
           </a:p>
         </p:txBody>
@@ -15706,7 +16614,7 @@
           <p:cNvPr id="4" name="Date Placeholder 3">
             <a:extLst>
               <a:ext uri="{FF2B5EF4-FFF2-40B4-BE49-F238E27FC236}">
-                <a16:creationId xmlns:a16="http://schemas.microsoft.com/office/drawing/2014/main" id="{58EA3CF3-42A7-4E41-869A-BE3767CDB53E}"/>
+                <a16:creationId xmlns:a16="http://schemas.microsoft.com/office/drawing/2014/main" id="{795AF78F-96EA-4231-BDDD-33FC0179AD3B}"/>
               </a:ext>
             </a:extLst>
           </p:cNvPr>
@@ -15735,7 +16643,7 @@
           <p:cNvPr id="5" name="Footer Placeholder 4">
             <a:extLst>
               <a:ext uri="{FF2B5EF4-FFF2-40B4-BE49-F238E27FC236}">
-                <a16:creationId xmlns:a16="http://schemas.microsoft.com/office/drawing/2014/main" id="{75633ADC-5CEC-49E7-BF4C-B805C52E296D}"/>
+                <a16:creationId xmlns:a16="http://schemas.microsoft.com/office/drawing/2014/main" id="{45E5161D-777B-4BBE-81D2-EB323B42B75A}"/>
               </a:ext>
             </a:extLst>
           </p:cNvPr>
@@ -15792,7 +16700,7 @@
           <p:cNvPr id="6" name="Slide Number Placeholder 5">
             <a:extLst>
               <a:ext uri="{FF2B5EF4-FFF2-40B4-BE49-F238E27FC236}">
-                <a16:creationId xmlns:a16="http://schemas.microsoft.com/office/drawing/2014/main" id="{B1BAA732-BBD1-4FE8-891E-2C7E97D82282}"/>
+                <a16:creationId xmlns:a16="http://schemas.microsoft.com/office/drawing/2014/main" id="{80D8E905-9CD6-41B2-BD6F-90D8CCFE1537}"/>
               </a:ext>
             </a:extLst>
           </p:cNvPr>
@@ -15816,10 +16724,40 @@
           </a:p>
         </p:txBody>
       </p:sp>
+      <p:pic>
+        <p:nvPicPr>
+          <p:cNvPr id="8" name="Picture 7" descr="A screenshot of a cell phone&#10;&#10;Description automatically generated">
+            <a:extLst>
+              <a:ext uri="{FF2B5EF4-FFF2-40B4-BE49-F238E27FC236}">
+                <a16:creationId xmlns:a16="http://schemas.microsoft.com/office/drawing/2014/main" id="{39772CD0-595B-4831-B20F-61C66F39D332}"/>
+              </a:ext>
+            </a:extLst>
+          </p:cNvPr>
+          <p:cNvPicPr>
+            <a:picLocks noChangeAspect="1"/>
+          </p:cNvPicPr>
+          <p:nvPr/>
+        </p:nvPicPr>
+        <p:blipFill>
+          <a:blip r:embed="rId2"/>
+          <a:stretch>
+            <a:fillRect/>
+          </a:stretch>
+        </p:blipFill>
+        <p:spPr>
+          <a:xfrm>
+            <a:off x="6089669" y="2166730"/>
+            <a:ext cx="5704474" cy="3779888"/>
+          </a:xfrm>
+          <a:prstGeom prst="rect">
+            <a:avLst/>
+          </a:prstGeom>
+        </p:spPr>
+      </p:pic>
     </p:spTree>
     <p:extLst>
       <p:ext uri="{BB962C8B-B14F-4D97-AF65-F5344CB8AC3E}">
-        <p14:creationId xmlns:p14="http://schemas.microsoft.com/office/powerpoint/2010/main" val="3226142298"/>
+        <p14:creationId xmlns:p14="http://schemas.microsoft.com/office/powerpoint/2010/main" val="2534574857"/>
       </p:ext>
     </p:extLst>
   </p:cSld>
@@ -15851,7 +16789,7 @@
           <p:cNvPr id="2" name="Title 1">
             <a:extLst>
               <a:ext uri="{FF2B5EF4-FFF2-40B4-BE49-F238E27FC236}">
-                <a16:creationId xmlns:a16="http://schemas.microsoft.com/office/drawing/2014/main" id="{C0CB272F-7F81-477F-8457-DF92B499DBC9}"/>
+                <a16:creationId xmlns:a16="http://schemas.microsoft.com/office/drawing/2014/main" id="{E850068E-C01E-4BED-AF24-C2E9D57DABAC}"/>
               </a:ext>
             </a:extLst>
           </p:cNvPr>
@@ -15869,7 +16807,7 @@
           <a:p>
             <a:r>
               <a:rPr lang="en-US" dirty="0"/>
-              <a:t>FACETS</a:t>
+              <a:t>COLORS</a:t>
             </a:r>
           </a:p>
         </p:txBody>
@@ -15879,7 +16817,7 @@
           <p:cNvPr id="3" name="Content Placeholder 2">
             <a:extLst>
               <a:ext uri="{FF2B5EF4-FFF2-40B4-BE49-F238E27FC236}">
-                <a16:creationId xmlns:a16="http://schemas.microsoft.com/office/drawing/2014/main" id="{6BC707E2-E3EA-4C43-9AA0-BE38BA10BAC3}"/>
+                <a16:creationId xmlns:a16="http://schemas.microsoft.com/office/drawing/2014/main" id="{37E146B7-6BDE-4F21-A09D-FE7EF30B6C00}"/>
               </a:ext>
             </a:extLst>
           </p:cNvPr>
@@ -15890,47 +16828,146 @@
             <p:ph idx="1"/>
           </p:nvPr>
         </p:nvSpPr>
-        <p:spPr/>
-        <p:txBody>
-          <a:bodyPr/>
-          <a:lstStyle/>
-          <a:p>
-            <a:r>
-              <a:rPr lang="en-US" dirty="0"/>
-              <a:t>Instead of coloring third variables, you can also make gridded plots for each subset of the data</a:t>
-            </a:r>
-          </a:p>
-          <a:p>
-            <a:r>
-              <a:rPr lang="en-US" dirty="0" err="1">
-                <a:latin typeface="Courier New" panose="02070309020205020404" pitchFamily="49" charset="0"/>
-                <a:cs typeface="Courier New" panose="02070309020205020404" pitchFamily="49" charset="0"/>
-              </a:rPr>
-              <a:t>facet_wrap</a:t>
-            </a:r>
-            <a:r>
-              <a:rPr lang="en-US" dirty="0">
+        <p:spPr>
+          <a:xfrm>
+            <a:off x="838200" y="1825625"/>
+            <a:ext cx="5443330" cy="4351338"/>
+          </a:xfrm>
+        </p:spPr>
+        <p:txBody>
+          <a:bodyPr/>
+          <a:lstStyle/>
+          <a:p>
+            <a:r>
+              <a:rPr lang="en-US" dirty="0"/>
+              <a:t>You can color points two ways to get a ‘third dimension’ on your plots:</a:t>
+            </a:r>
+          </a:p>
+          <a:p>
+            <a:pPr lvl="1"/>
+            <a:r>
+              <a:rPr lang="en-US" dirty="0"/>
+              <a:t>Continuous: </a:t>
+            </a:r>
+            <a:r>
+              <a:rPr lang="en-US" sz="2800" dirty="0">
+                <a:latin typeface="Courier New" panose="02070309020205020404" pitchFamily="49" charset="0"/>
+                <a:cs typeface="Courier New" panose="02070309020205020404" pitchFamily="49" charset="0"/>
+              </a:rPr>
+              <a:t>color</a:t>
+            </a:r>
+            <a:r>
+              <a:rPr lang="en-US" dirty="0"/>
+              <a:t> </a:t>
+            </a:r>
+            <a:r>
+              <a:rPr lang="en-US" sz="2800" dirty="0">
+                <a:latin typeface="Courier New" panose="02070309020205020404" pitchFamily="49" charset="0"/>
+                <a:cs typeface="Courier New" panose="02070309020205020404" pitchFamily="49" charset="0"/>
+              </a:rPr>
+              <a:t>=</a:t>
+            </a:r>
+            <a:r>
+              <a:rPr lang="en-US" dirty="0"/>
+              <a:t> </a:t>
+            </a:r>
+            <a:r>
+              <a:rPr lang="en-US" sz="2800" dirty="0">
+                <a:latin typeface="Courier New" panose="02070309020205020404" pitchFamily="49" charset="0"/>
+                <a:cs typeface="Courier New" panose="02070309020205020404" pitchFamily="49" charset="0"/>
+              </a:rPr>
+              <a:t>column,</a:t>
+            </a:r>
+            <a:r>
+              <a:rPr lang="en-US" dirty="0"/>
+              <a:t> then add a color scale with </a:t>
+            </a:r>
+            <a:r>
+              <a:rPr lang="en-US" sz="2800" dirty="0" err="1">
+                <a:latin typeface="Courier New" panose="02070309020205020404" pitchFamily="49" charset="0"/>
+                <a:cs typeface="Courier New" panose="02070309020205020404" pitchFamily="49" charset="0"/>
+              </a:rPr>
+              <a:t>scale</a:t>
+            </a:r>
+            <a:r>
+              <a:rPr lang="en-US" dirty="0" err="1"/>
+              <a:t>_</a:t>
+            </a:r>
+            <a:r>
+              <a:rPr lang="en-US" sz="2800" dirty="0" err="1">
+                <a:latin typeface="Courier New" panose="02070309020205020404" pitchFamily="49" charset="0"/>
+                <a:cs typeface="Courier New" panose="02070309020205020404" pitchFamily="49" charset="0"/>
+              </a:rPr>
+              <a:t>color</a:t>
+            </a:r>
+            <a:r>
+              <a:rPr lang="en-US" dirty="0" err="1"/>
+              <a:t>_</a:t>
+            </a:r>
+            <a:r>
+              <a:rPr lang="en-US" sz="2800" dirty="0" err="1">
+                <a:latin typeface="Courier New" panose="02070309020205020404" pitchFamily="49" charset="0"/>
+                <a:cs typeface="Courier New" panose="02070309020205020404" pitchFamily="49" charset="0"/>
+              </a:rPr>
+              <a:t>viridis</a:t>
+            </a:r>
+            <a:r>
+              <a:rPr lang="en-US" sz="2800" dirty="0">
                 <a:latin typeface="Courier New" panose="02070309020205020404" pitchFamily="49" charset="0"/>
                 <a:cs typeface="Courier New" panose="02070309020205020404" pitchFamily="49" charset="0"/>
               </a:rPr>
               <a:t>()</a:t>
             </a:r>
-          </a:p>
-          <a:p>
-            <a:r>
-              <a:rPr lang="en-US" dirty="0" err="1">
-                <a:latin typeface="Courier New" panose="02070309020205020404" pitchFamily="49" charset="0"/>
-                <a:cs typeface="Courier New" panose="02070309020205020404" pitchFamily="49" charset="0"/>
-              </a:rPr>
-              <a:t>facet_grid</a:t>
-            </a:r>
-            <a:r>
-              <a:rPr lang="en-US" dirty="0">
+            <a:r>
+              <a:rPr lang="en-US" dirty="0"/>
+              <a:t> or something similar</a:t>
+            </a:r>
+          </a:p>
+          <a:p>
+            <a:pPr lvl="1"/>
+            <a:r>
+              <a:rPr lang="en-US" dirty="0"/>
+              <a:t>Discrete: </a:t>
+            </a:r>
+            <a:r>
+              <a:rPr lang="en-US" sz="2800" dirty="0">
+                <a:latin typeface="Courier New" panose="02070309020205020404" pitchFamily="49" charset="0"/>
+                <a:cs typeface="Courier New" panose="02070309020205020404" pitchFamily="49" charset="0"/>
+              </a:rPr>
+              <a:t>color</a:t>
+            </a:r>
+            <a:r>
+              <a:rPr lang="en-US" dirty="0"/>
+              <a:t> = </a:t>
+            </a:r>
+            <a:r>
+              <a:rPr lang="en-US" sz="2800" dirty="0">
+                <a:latin typeface="Courier New" panose="02070309020205020404" pitchFamily="49" charset="0"/>
+                <a:cs typeface="Courier New" panose="02070309020205020404" pitchFamily="49" charset="0"/>
+              </a:rPr>
+              <a:t>column </a:t>
+            </a:r>
+            <a:r>
+              <a:rPr lang="en-US" dirty="0"/>
+              <a:t>in </a:t>
+            </a:r>
+            <a:r>
+              <a:rPr lang="en-US" sz="2800" dirty="0" err="1">
+                <a:latin typeface="Courier New" panose="02070309020205020404" pitchFamily="49" charset="0"/>
+                <a:cs typeface="Courier New" panose="02070309020205020404" pitchFamily="49" charset="0"/>
+              </a:rPr>
+              <a:t>aes</a:t>
+            </a:r>
+            <a:r>
+              <a:rPr lang="en-US" sz="2800" dirty="0">
                 <a:latin typeface="Courier New" panose="02070309020205020404" pitchFamily="49" charset="0"/>
                 <a:cs typeface="Courier New" panose="02070309020205020404" pitchFamily="49" charset="0"/>
               </a:rPr>
               <a:t>()</a:t>
             </a:r>
+          </a:p>
+          <a:p>
+            <a:pPr lvl="1"/>
             <a:endParaRPr lang="en-US" dirty="0"/>
           </a:p>
         </p:txBody>
@@ -15940,7 +16977,7 @@
           <p:cNvPr id="4" name="Date Placeholder 3">
             <a:extLst>
               <a:ext uri="{FF2B5EF4-FFF2-40B4-BE49-F238E27FC236}">
-                <a16:creationId xmlns:a16="http://schemas.microsoft.com/office/drawing/2014/main" id="{93CFF671-EF2F-4B41-B0DF-212711FF9111}"/>
+                <a16:creationId xmlns:a16="http://schemas.microsoft.com/office/drawing/2014/main" id="{58EA3CF3-42A7-4E41-869A-BE3767CDB53E}"/>
               </a:ext>
             </a:extLst>
           </p:cNvPr>
@@ -15969,7 +17006,7 @@
           <p:cNvPr id="5" name="Footer Placeholder 4">
             <a:extLst>
               <a:ext uri="{FF2B5EF4-FFF2-40B4-BE49-F238E27FC236}">
-                <a16:creationId xmlns:a16="http://schemas.microsoft.com/office/drawing/2014/main" id="{FE0384EA-9794-42B6-89F0-804EDF8F71F2}"/>
+                <a16:creationId xmlns:a16="http://schemas.microsoft.com/office/drawing/2014/main" id="{75633ADC-5CEC-49E7-BF4C-B805C52E296D}"/>
               </a:ext>
             </a:extLst>
           </p:cNvPr>
@@ -16026,7 +17063,7 @@
           <p:cNvPr id="6" name="Slide Number Placeholder 5">
             <a:extLst>
               <a:ext uri="{FF2B5EF4-FFF2-40B4-BE49-F238E27FC236}">
-                <a16:creationId xmlns:a16="http://schemas.microsoft.com/office/drawing/2014/main" id="{F7D9DA6F-0E92-4216-B0CA-EB20441D3903}"/>
+                <a16:creationId xmlns:a16="http://schemas.microsoft.com/office/drawing/2014/main" id="{B1BAA732-BBD1-4FE8-891E-2C7E97D82282}"/>
               </a:ext>
             </a:extLst>
           </p:cNvPr>
@@ -16050,10 +17087,40 @@
           </a:p>
         </p:txBody>
       </p:sp>
+      <p:pic>
+        <p:nvPicPr>
+          <p:cNvPr id="8" name="Picture 7">
+            <a:extLst>
+              <a:ext uri="{FF2B5EF4-FFF2-40B4-BE49-F238E27FC236}">
+                <a16:creationId xmlns:a16="http://schemas.microsoft.com/office/drawing/2014/main" id="{09828C8C-2466-405C-8DE1-8BDFC4BC1946}"/>
+              </a:ext>
+            </a:extLst>
+          </p:cNvPr>
+          <p:cNvPicPr>
+            <a:picLocks noChangeAspect="1"/>
+          </p:cNvPicPr>
+          <p:nvPr/>
+        </p:nvPicPr>
+        <p:blipFill>
+          <a:blip r:embed="rId2"/>
+          <a:stretch>
+            <a:fillRect/>
+          </a:stretch>
+        </p:blipFill>
+        <p:spPr>
+          <a:xfrm>
+            <a:off x="6244532" y="1825625"/>
+            <a:ext cx="5947468" cy="3940900"/>
+          </a:xfrm>
+          <a:prstGeom prst="rect">
+            <a:avLst/>
+          </a:prstGeom>
+        </p:spPr>
+      </p:pic>
     </p:spTree>
     <p:extLst>
       <p:ext uri="{BB962C8B-B14F-4D97-AF65-F5344CB8AC3E}">
-        <p14:creationId xmlns:p14="http://schemas.microsoft.com/office/powerpoint/2010/main" val="964372467"/>
+        <p14:creationId xmlns:p14="http://schemas.microsoft.com/office/powerpoint/2010/main" val="3226142298"/>
       </p:ext>
     </p:extLst>
   </p:cSld>
@@ -16066,6 +17133,14 @@
 <file path=ppt/slides/slide43.xml><?xml version="1.0" encoding="utf-8"?>
 <p:sld xmlns:a="http://schemas.openxmlformats.org/drawingml/2006/main" xmlns:r="http://schemas.openxmlformats.org/officeDocument/2006/relationships" xmlns:p="http://schemas.openxmlformats.org/presentationml/2006/main">
   <p:cSld>
+    <p:bg>
+      <p:bgPr>
+        <a:solidFill>
+          <a:schemeClr val="bg1"/>
+        </a:solidFill>
+        <a:effectLst/>
+      </p:bgPr>
+    </p:bg>
     <p:spTree>
       <p:nvGrpSpPr>
         <p:cNvPr id="1" name=""/>
@@ -16085,7 +17160,7 @@
           <p:cNvPr id="2" name="Title 1">
             <a:extLst>
               <a:ext uri="{FF2B5EF4-FFF2-40B4-BE49-F238E27FC236}">
-                <a16:creationId xmlns:a16="http://schemas.microsoft.com/office/drawing/2014/main" id="{E850068E-C01E-4BED-AF24-C2E9D57DABAC}"/>
+                <a16:creationId xmlns:a16="http://schemas.microsoft.com/office/drawing/2014/main" id="{C0CB272F-7F81-477F-8457-DF92B499DBC9}"/>
               </a:ext>
             </a:extLst>
           </p:cNvPr>
@@ -16103,7 +17178,7 @@
           <a:p>
             <a:r>
               <a:rPr lang="en-US" dirty="0"/>
-              <a:t>LABELING</a:t>
+              <a:t>FACETS</a:t>
             </a:r>
           </a:p>
         </p:txBody>
@@ -16113,7 +17188,7 @@
           <p:cNvPr id="3" name="Content Placeholder 2">
             <a:extLst>
               <a:ext uri="{FF2B5EF4-FFF2-40B4-BE49-F238E27FC236}">
-                <a16:creationId xmlns:a16="http://schemas.microsoft.com/office/drawing/2014/main" id="{37E146B7-6BDE-4F21-A09D-FE7EF30B6C00}"/>
+                <a16:creationId xmlns:a16="http://schemas.microsoft.com/office/drawing/2014/main" id="{6BC707E2-E3EA-4C43-9AA0-BE38BA10BAC3}"/>
               </a:ext>
             </a:extLst>
           </p:cNvPr>
@@ -16124,83 +17199,120 @@
             <p:ph idx="1"/>
           </p:nvPr>
         </p:nvSpPr>
-        <p:spPr/>
-        <p:txBody>
-          <a:bodyPr/>
-          <a:lstStyle/>
-          <a:p>
+        <p:spPr>
+          <a:xfrm>
+            <a:off x="838200" y="1825625"/>
+            <a:ext cx="5029200" cy="4351338"/>
+          </a:xfrm>
+        </p:spPr>
+        <p:txBody>
+          <a:bodyPr/>
+          <a:lstStyle/>
+          <a:p>
+            <a:r>
+              <a:rPr lang="en-US" dirty="0"/>
+              <a:t>Instead of coloring third variables, you can also make grids of plots for each categorical group of the data</a:t>
+            </a:r>
+          </a:p>
+          <a:p>
+            <a:r>
+              <a:rPr lang="en-US" dirty="0"/>
+              <a:t>Needs a formula! Specify the column with a </a:t>
+            </a:r>
             <a:r>
               <a:rPr lang="en-US" dirty="0">
                 <a:latin typeface="Courier New" panose="02070309020205020404" pitchFamily="49" charset="0"/>
                 <a:cs typeface="Courier New" panose="02070309020205020404" pitchFamily="49" charset="0"/>
               </a:rPr>
-              <a:t>labs(title=“”, x=“”, y=“”)</a:t>
-            </a:r>
-          </a:p>
-          <a:p>
-            <a:r>
-              <a:rPr lang="en-US" dirty="0"/>
-              <a:t>Add axis titles:</a:t>
-            </a:r>
-          </a:p>
-          <a:p>
-            <a:pPr lvl="1"/>
-            <a:r>
-              <a:rPr lang="en-US" sz="2800" dirty="0">
-                <a:latin typeface="Courier New" panose="02070309020205020404" pitchFamily="49" charset="0"/>
-                <a:cs typeface="Courier New" panose="02070309020205020404" pitchFamily="49" charset="0"/>
-              </a:rPr>
-              <a:t>x=“title”</a:t>
-            </a:r>
-            <a:r>
-              <a:rPr lang="en-US" dirty="0"/>
-              <a:t> and </a:t>
-            </a:r>
-            <a:r>
-              <a:rPr lang="en-US" sz="2800" dirty="0">
-                <a:latin typeface="Courier New" panose="02070309020205020404" pitchFamily="49" charset="0"/>
-                <a:cs typeface="Courier New" panose="02070309020205020404" pitchFamily="49" charset="0"/>
-              </a:rPr>
-              <a:t>y=“title”</a:t>
-            </a:r>
-          </a:p>
-          <a:p>
-            <a:r>
-              <a:rPr lang="en-US" dirty="0"/>
-              <a:t>For discrete data, especially for bar charts, you might want to rotate your axis labels!</a:t>
-            </a:r>
-          </a:p>
-          <a:p>
-            <a:pPr lvl="1"/>
-            <a:r>
-              <a:rPr lang="en-US" dirty="0"/>
-              <a:t>Theme(</a:t>
-            </a:r>
-            <a:r>
-              <a:rPr lang="en-US" dirty="0" err="1"/>
-              <a:t>axis.text.x</a:t>
-            </a:r>
-            <a:r>
-              <a:rPr lang="en-US" dirty="0"/>
-              <a:t> = </a:t>
-            </a:r>
-            <a:r>
-              <a:rPr lang="en-US" dirty="0" err="1"/>
-              <a:t>element_text</a:t>
-            </a:r>
-            <a:r>
-              <a:rPr lang="en-US" dirty="0"/>
-              <a:t>(angle  = 90, </a:t>
-            </a:r>
-            <a:r>
-              <a:rPr lang="en-US" dirty="0" err="1"/>
-              <a:t>hjust</a:t>
-            </a:r>
-            <a:r>
-              <a:rPr lang="en-US"/>
-              <a:t> = 1))</a:t>
-            </a:r>
-            <a:endParaRPr lang="en-US" dirty="0"/>
+              <a:t>~</a:t>
+            </a:r>
+            <a:r>
+              <a:rPr lang="en-US" dirty="0"/>
+              <a:t> before it</a:t>
+            </a:r>
+          </a:p>
+          <a:p>
+            <a:r>
+              <a:rPr lang="en-US" dirty="0" err="1">
+                <a:latin typeface="Courier New" panose="02070309020205020404" pitchFamily="49" charset="0"/>
+                <a:cs typeface="Courier New" panose="02070309020205020404" pitchFamily="49" charset="0"/>
+              </a:rPr>
+              <a:t>facet_wrap</a:t>
+            </a:r>
+            <a:r>
+              <a:rPr lang="en-US" dirty="0">
+                <a:latin typeface="Courier New" panose="02070309020205020404" pitchFamily="49" charset="0"/>
+                <a:cs typeface="Courier New" panose="02070309020205020404" pitchFamily="49" charset="0"/>
+              </a:rPr>
+              <a:t>(~ </a:t>
+            </a:r>
+            <a:r>
+              <a:rPr lang="en-US" dirty="0" err="1">
+                <a:latin typeface="Courier New" panose="02070309020205020404" pitchFamily="49" charset="0"/>
+                <a:cs typeface="Courier New" panose="02070309020205020404" pitchFamily="49" charset="0"/>
+              </a:rPr>
+              <a:t>colname</a:t>
+            </a:r>
+            <a:r>
+              <a:rPr lang="en-US" dirty="0">
+                <a:latin typeface="Courier New" panose="02070309020205020404" pitchFamily="49" charset="0"/>
+                <a:cs typeface="Courier New" panose="02070309020205020404" pitchFamily="49" charset="0"/>
+              </a:rPr>
+              <a:t>) </a:t>
+            </a:r>
+            <a:r>
+              <a:rPr lang="en-US" dirty="0">
+                <a:cs typeface="Courier New" panose="02070309020205020404" pitchFamily="49" charset="0"/>
+              </a:rPr>
+              <a:t>or</a:t>
+            </a:r>
+            <a:r>
+              <a:rPr lang="en-US" dirty="0">
+                <a:latin typeface="Courier New" panose="02070309020205020404" pitchFamily="49" charset="0"/>
+                <a:cs typeface="Courier New" panose="02070309020205020404" pitchFamily="49" charset="0"/>
+              </a:rPr>
+              <a:t> </a:t>
+            </a:r>
+          </a:p>
+          <a:p>
+            <a:pPr marL="0" indent="0">
+              <a:buNone/>
+            </a:pPr>
+            <a:r>
+              <a:rPr lang="en-US" dirty="0">
+                <a:latin typeface="Courier New" panose="02070309020205020404" pitchFamily="49" charset="0"/>
+                <a:cs typeface="Courier New" panose="02070309020205020404" pitchFamily="49" charset="0"/>
+              </a:rPr>
+              <a:t> </a:t>
+            </a:r>
+            <a:r>
+              <a:rPr lang="en-US" dirty="0" err="1">
+                <a:latin typeface="Courier New" panose="02070309020205020404" pitchFamily="49" charset="0"/>
+                <a:cs typeface="Courier New" panose="02070309020205020404" pitchFamily="49" charset="0"/>
+              </a:rPr>
+              <a:t>facet_grid</a:t>
+            </a:r>
+            <a:r>
+              <a:rPr lang="en-US" dirty="0">
+                <a:latin typeface="Courier New" panose="02070309020205020404" pitchFamily="49" charset="0"/>
+                <a:cs typeface="Courier New" panose="02070309020205020404" pitchFamily="49" charset="0"/>
+              </a:rPr>
+              <a:t>(~ </a:t>
+            </a:r>
+            <a:r>
+              <a:rPr lang="en-US" dirty="0" err="1">
+                <a:latin typeface="Courier New" panose="02070309020205020404" pitchFamily="49" charset="0"/>
+                <a:cs typeface="Courier New" panose="02070309020205020404" pitchFamily="49" charset="0"/>
+              </a:rPr>
+              <a:t>colname</a:t>
+            </a:r>
+            <a:r>
+              <a:rPr lang="en-US" dirty="0">
+                <a:latin typeface="Courier New" panose="02070309020205020404" pitchFamily="49" charset="0"/>
+                <a:cs typeface="Courier New" panose="02070309020205020404" pitchFamily="49" charset="0"/>
+              </a:rPr>
+              <a:t>)</a:t>
+            </a:r>
           </a:p>
         </p:txBody>
       </p:sp>
@@ -16209,7 +17321,7 @@
           <p:cNvPr id="4" name="Date Placeholder 3">
             <a:extLst>
               <a:ext uri="{FF2B5EF4-FFF2-40B4-BE49-F238E27FC236}">
-                <a16:creationId xmlns:a16="http://schemas.microsoft.com/office/drawing/2014/main" id="{58EA3CF3-42A7-4E41-869A-BE3767CDB53E}"/>
+                <a16:creationId xmlns:a16="http://schemas.microsoft.com/office/drawing/2014/main" id="{93CFF671-EF2F-4B41-B0DF-212711FF9111}"/>
               </a:ext>
             </a:extLst>
           </p:cNvPr>
@@ -16238,7 +17350,7 @@
           <p:cNvPr id="5" name="Footer Placeholder 4">
             <a:extLst>
               <a:ext uri="{FF2B5EF4-FFF2-40B4-BE49-F238E27FC236}">
-                <a16:creationId xmlns:a16="http://schemas.microsoft.com/office/drawing/2014/main" id="{75633ADC-5CEC-49E7-BF4C-B805C52E296D}"/>
+                <a16:creationId xmlns:a16="http://schemas.microsoft.com/office/drawing/2014/main" id="{FE0384EA-9794-42B6-89F0-804EDF8F71F2}"/>
               </a:ext>
             </a:extLst>
           </p:cNvPr>
@@ -16295,7 +17407,7 @@
           <p:cNvPr id="6" name="Slide Number Placeholder 5">
             <a:extLst>
               <a:ext uri="{FF2B5EF4-FFF2-40B4-BE49-F238E27FC236}">
-                <a16:creationId xmlns:a16="http://schemas.microsoft.com/office/drawing/2014/main" id="{B1BAA732-BBD1-4FE8-891E-2C7E97D82282}"/>
+                <a16:creationId xmlns:a16="http://schemas.microsoft.com/office/drawing/2014/main" id="{F7D9DA6F-0E92-4216-B0CA-EB20441D3903}"/>
               </a:ext>
             </a:extLst>
           </p:cNvPr>
@@ -16319,15 +17431,45 @@
           </a:p>
         </p:txBody>
       </p:sp>
+      <p:pic>
+        <p:nvPicPr>
+          <p:cNvPr id="8" name="Picture 7">
+            <a:extLst>
+              <a:ext uri="{FF2B5EF4-FFF2-40B4-BE49-F238E27FC236}">
+                <a16:creationId xmlns:a16="http://schemas.microsoft.com/office/drawing/2014/main" id="{529B2765-95AE-46F6-9DB3-B281DF4708EE}"/>
+              </a:ext>
+            </a:extLst>
+          </p:cNvPr>
+          <p:cNvPicPr>
+            <a:picLocks noChangeAspect="1"/>
+          </p:cNvPicPr>
+          <p:nvPr/>
+        </p:nvPicPr>
+        <p:blipFill>
+          <a:blip r:embed="rId3"/>
+          <a:stretch>
+            <a:fillRect/>
+          </a:stretch>
+        </p:blipFill>
+        <p:spPr>
+          <a:xfrm>
+            <a:off x="5657441" y="1870075"/>
+            <a:ext cx="6315898" cy="4185029"/>
+          </a:xfrm>
+          <a:prstGeom prst="rect">
+            <a:avLst/>
+          </a:prstGeom>
+        </p:spPr>
+      </p:pic>
     </p:spTree>
     <p:extLst>
       <p:ext uri="{BB962C8B-B14F-4D97-AF65-F5344CB8AC3E}">
-        <p14:creationId xmlns:p14="http://schemas.microsoft.com/office/powerpoint/2010/main" val="2483438752"/>
+        <p14:creationId xmlns:p14="http://schemas.microsoft.com/office/powerpoint/2010/main" val="964372467"/>
       </p:ext>
     </p:extLst>
   </p:cSld>
   <p:clrMapOvr>
-    <a:masterClrMapping/>
+    <a:overrideClrMapping bg1="lt1" tx1="dk1" bg2="lt2" tx2="dk2" accent1="accent1" accent2="accent2" accent3="accent3" accent4="accent4" accent5="accent5" accent6="accent6" hlink="hlink" folHlink="folHlink"/>
   </p:clrMapOvr>
 </p:sld>
 </file>
@@ -16354,7 +17496,7 @@
           <p:cNvPr id="2" name="Title 1">
             <a:extLst>
               <a:ext uri="{FF2B5EF4-FFF2-40B4-BE49-F238E27FC236}">
-                <a16:creationId xmlns:a16="http://schemas.microsoft.com/office/drawing/2014/main" id="{3355F5CD-9232-4308-9E65-DB6DA7EBF80E}"/>
+                <a16:creationId xmlns:a16="http://schemas.microsoft.com/office/drawing/2014/main" id="{E850068E-C01E-4BED-AF24-C2E9D57DABAC}"/>
               </a:ext>
             </a:extLst>
           </p:cNvPr>
@@ -16372,7 +17514,7 @@
           <a:p>
             <a:r>
               <a:rPr lang="en-US" dirty="0"/>
-              <a:t>PUTTING IT TOGETHER</a:t>
+              <a:t>LABELING</a:t>
             </a:r>
           </a:p>
         </p:txBody>
@@ -16382,7 +17524,7 @@
           <p:cNvPr id="3" name="Content Placeholder 2">
             <a:extLst>
               <a:ext uri="{FF2B5EF4-FFF2-40B4-BE49-F238E27FC236}">
-                <a16:creationId xmlns:a16="http://schemas.microsoft.com/office/drawing/2014/main" id="{62EAA16E-823F-4C14-86FD-FED8F2321EE6}"/>
+                <a16:creationId xmlns:a16="http://schemas.microsoft.com/office/drawing/2014/main" id="{37E146B7-6BDE-4F21-A09D-FE7EF30B6C00}"/>
               </a:ext>
             </a:extLst>
           </p:cNvPr>
@@ -16393,38 +17535,79 @@
             <p:ph idx="1"/>
           </p:nvPr>
         </p:nvSpPr>
-        <p:spPr/>
-        <p:txBody>
-          <a:bodyPr/>
-          <a:lstStyle/>
-          <a:p>
-            <a:r>
-              <a:rPr lang="en-US" dirty="0" err="1">
-                <a:latin typeface="Courier New" panose="02070309020205020404" pitchFamily="49" charset="0"/>
-                <a:cs typeface="Courier New" panose="02070309020205020404" pitchFamily="49" charset="0"/>
-              </a:rPr>
-              <a:t>ggplot</a:t>
-            </a:r>
-            <a:r>
-              <a:rPr lang="en-US" dirty="0"/>
-              <a:t> uses the</a:t>
-            </a:r>
+        <p:spPr>
+          <a:xfrm>
+            <a:off x="838200" y="1825625"/>
+            <a:ext cx="5105400" cy="4351338"/>
+          </a:xfrm>
+        </p:spPr>
+        <p:txBody>
+          <a:bodyPr>
+            <a:normAutofit/>
+          </a:bodyPr>
+          <a:lstStyle/>
+          <a:p>
             <a:r>
               <a:rPr lang="en-US" dirty="0">
                 <a:latin typeface="Courier New" panose="02070309020205020404" pitchFamily="49" charset="0"/>
                 <a:cs typeface="Courier New" panose="02070309020205020404" pitchFamily="49" charset="0"/>
               </a:rPr>
-              <a:t> + </a:t>
-            </a:r>
-            <a:r>
-              <a:rPr lang="en-US" dirty="0"/>
-              <a:t>as a linker between layers</a:t>
-            </a:r>
-          </a:p>
-          <a:p>
-            <a:r>
-              <a:rPr lang="en-US" dirty="0"/>
-              <a:t>Just like the pipe, you can combine tons of these together!</a:t>
+              <a:t>labs(title=“”, x=“”, y=“”)</a:t>
+            </a:r>
+          </a:p>
+          <a:p>
+            <a:r>
+              <a:rPr lang="en-US" dirty="0"/>
+              <a:t>Add axis titles:</a:t>
+            </a:r>
+          </a:p>
+          <a:p>
+            <a:pPr lvl="1"/>
+            <a:r>
+              <a:rPr lang="en-US" sz="2800" dirty="0">
+                <a:latin typeface="Courier New" panose="02070309020205020404" pitchFamily="49" charset="0"/>
+                <a:cs typeface="Courier New" panose="02070309020205020404" pitchFamily="49" charset="0"/>
+              </a:rPr>
+              <a:t>x=“title”</a:t>
+            </a:r>
+            <a:r>
+              <a:rPr lang="en-US" dirty="0"/>
+              <a:t> and </a:t>
+            </a:r>
+            <a:r>
+              <a:rPr lang="en-US" sz="2800" dirty="0">
+                <a:latin typeface="Courier New" panose="02070309020205020404" pitchFamily="49" charset="0"/>
+                <a:cs typeface="Courier New" panose="02070309020205020404" pitchFamily="49" charset="0"/>
+              </a:rPr>
+              <a:t>y=“title”</a:t>
+            </a:r>
+          </a:p>
+          <a:p>
+            <a:r>
+              <a:rPr lang="en-US" sz="3200" dirty="0">
+                <a:cs typeface="Courier New" panose="02070309020205020404" pitchFamily="49" charset="0"/>
+              </a:rPr>
+              <a:t>Main title:</a:t>
+            </a:r>
+          </a:p>
+          <a:p>
+            <a:pPr lvl="1"/>
+            <a:r>
+              <a:rPr lang="en-US" sz="2800" dirty="0">
+                <a:latin typeface="Courier New" panose="02070309020205020404" pitchFamily="49" charset="0"/>
+                <a:cs typeface="Courier New" panose="02070309020205020404" pitchFamily="49" charset="0"/>
+              </a:rPr>
+              <a:t>title = “title”</a:t>
+            </a:r>
+          </a:p>
+          <a:p>
+            <a:pPr lvl="1"/>
+            <a:r>
+              <a:rPr lang="en-US" sz="2800" dirty="0">
+                <a:latin typeface="Courier New" panose="02070309020205020404" pitchFamily="49" charset="0"/>
+                <a:cs typeface="Courier New" panose="02070309020205020404" pitchFamily="49" charset="0"/>
+              </a:rPr>
+              <a:t>subtitle = “title”</a:t>
             </a:r>
           </a:p>
         </p:txBody>
@@ -16434,7 +17617,7 @@
           <p:cNvPr id="4" name="Date Placeholder 3">
             <a:extLst>
               <a:ext uri="{FF2B5EF4-FFF2-40B4-BE49-F238E27FC236}">
-                <a16:creationId xmlns:a16="http://schemas.microsoft.com/office/drawing/2014/main" id="{695F9B61-B132-4A1F-956F-C7FA5894868B}"/>
+                <a16:creationId xmlns:a16="http://schemas.microsoft.com/office/drawing/2014/main" id="{58EA3CF3-42A7-4E41-869A-BE3767CDB53E}"/>
               </a:ext>
             </a:extLst>
           </p:cNvPr>
@@ -16463,7 +17646,7 @@
           <p:cNvPr id="5" name="Footer Placeholder 4">
             <a:extLst>
               <a:ext uri="{FF2B5EF4-FFF2-40B4-BE49-F238E27FC236}">
-                <a16:creationId xmlns:a16="http://schemas.microsoft.com/office/drawing/2014/main" id="{DA540B43-4E0D-4617-A8E2-BB5B9401C854}"/>
+                <a16:creationId xmlns:a16="http://schemas.microsoft.com/office/drawing/2014/main" id="{75633ADC-5CEC-49E7-BF4C-B805C52E296D}"/>
               </a:ext>
             </a:extLst>
           </p:cNvPr>
@@ -16520,7 +17703,7 @@
           <p:cNvPr id="6" name="Slide Number Placeholder 5">
             <a:extLst>
               <a:ext uri="{FF2B5EF4-FFF2-40B4-BE49-F238E27FC236}">
-                <a16:creationId xmlns:a16="http://schemas.microsoft.com/office/drawing/2014/main" id="{B3BA36E9-613D-4BC5-B0F7-4BBB217DEE0E}"/>
+                <a16:creationId xmlns:a16="http://schemas.microsoft.com/office/drawing/2014/main" id="{B1BAA732-BBD1-4FE8-891E-2C7E97D82282}"/>
               </a:ext>
             </a:extLst>
           </p:cNvPr>
@@ -16544,10 +17727,40 @@
           </a:p>
         </p:txBody>
       </p:sp>
+      <p:pic>
+        <p:nvPicPr>
+          <p:cNvPr id="8" name="Picture 7" descr="A screenshot of a cell phone&#10;&#10;Description automatically generated">
+            <a:extLst>
+              <a:ext uri="{FF2B5EF4-FFF2-40B4-BE49-F238E27FC236}">
+                <a16:creationId xmlns:a16="http://schemas.microsoft.com/office/drawing/2014/main" id="{28F10AA7-533B-44CF-8346-56592B0DB1AE}"/>
+              </a:ext>
+            </a:extLst>
+          </p:cNvPr>
+          <p:cNvPicPr>
+            <a:picLocks noChangeAspect="1"/>
+          </p:cNvPicPr>
+          <p:nvPr/>
+        </p:nvPicPr>
+        <p:blipFill>
+          <a:blip r:embed="rId2"/>
+          <a:stretch>
+            <a:fillRect/>
+          </a:stretch>
+        </p:blipFill>
+        <p:spPr>
+          <a:xfrm>
+            <a:off x="5635969" y="1567207"/>
+            <a:ext cx="5949262" cy="3942089"/>
+          </a:xfrm>
+          <a:prstGeom prst="rect">
+            <a:avLst/>
+          </a:prstGeom>
+        </p:spPr>
+      </p:pic>
     </p:spTree>
     <p:extLst>
       <p:ext uri="{BB962C8B-B14F-4D97-AF65-F5344CB8AC3E}">
-        <p14:creationId xmlns:p14="http://schemas.microsoft.com/office/powerpoint/2010/main" val="844801094"/>
+        <p14:creationId xmlns:p14="http://schemas.microsoft.com/office/powerpoint/2010/main" val="2483438752"/>
       </p:ext>
     </p:extLst>
   </p:cSld>
@@ -16576,10 +17789,10 @@
       </p:grpSpPr>
       <p:sp>
         <p:nvSpPr>
-          <p:cNvPr id="7" name="Title 6">
-            <a:extLst>
-              <a:ext uri="{FF2B5EF4-FFF2-40B4-BE49-F238E27FC236}">
-                <a16:creationId xmlns:a16="http://schemas.microsoft.com/office/drawing/2014/main" id="{2C7C7B52-4FB0-4A0B-B5E1-EDD5A9ADA476}"/>
+          <p:cNvPr id="2" name="Title 1">
+            <a:extLst>
+              <a:ext uri="{FF2B5EF4-FFF2-40B4-BE49-F238E27FC236}">
+                <a16:creationId xmlns:a16="http://schemas.microsoft.com/office/drawing/2014/main" id="{3355F5CD-9232-4308-9E65-DB6DA7EBF80E}"/>
               </a:ext>
             </a:extLst>
           </p:cNvPr>
@@ -16597,35 +17810,59 @@
           <a:p>
             <a:r>
               <a:rPr lang="en-US" dirty="0"/>
-              <a:t>ALL TOGETHER NOW</a:t>
-            </a:r>
-          </a:p>
-        </p:txBody>
-      </p:sp>
-      <p:sp>
-        <p:nvSpPr>
-          <p:cNvPr id="8" name="Text Placeholder 7">
-            <a:extLst>
-              <a:ext uri="{FF2B5EF4-FFF2-40B4-BE49-F238E27FC236}">
-                <a16:creationId xmlns:a16="http://schemas.microsoft.com/office/drawing/2014/main" id="{235128D3-FA6E-47E7-87E1-272DD4C10B55}"/>
-              </a:ext>
-            </a:extLst>
-          </p:cNvPr>
-          <p:cNvSpPr>
-            <a:spLocks noGrp="1"/>
-          </p:cNvSpPr>
-          <p:nvPr>
-            <p:ph type="body" idx="1"/>
-          </p:nvPr>
-        </p:nvSpPr>
-        <p:spPr/>
-        <p:txBody>
-          <a:bodyPr/>
-          <a:lstStyle/>
-          <a:p>
-            <a:r>
-              <a:rPr lang="en-US" dirty="0"/>
-              <a:t>Integrating all the components</a:t>
+              <a:t>PUTTING IT TOGETHER</a:t>
+            </a:r>
+          </a:p>
+        </p:txBody>
+      </p:sp>
+      <p:sp>
+        <p:nvSpPr>
+          <p:cNvPr id="3" name="Content Placeholder 2">
+            <a:extLst>
+              <a:ext uri="{FF2B5EF4-FFF2-40B4-BE49-F238E27FC236}">
+                <a16:creationId xmlns:a16="http://schemas.microsoft.com/office/drawing/2014/main" id="{62EAA16E-823F-4C14-86FD-FED8F2321EE6}"/>
+              </a:ext>
+            </a:extLst>
+          </p:cNvPr>
+          <p:cNvSpPr>
+            <a:spLocks noGrp="1"/>
+          </p:cNvSpPr>
+          <p:nvPr>
+            <p:ph idx="1"/>
+          </p:nvPr>
+        </p:nvSpPr>
+        <p:spPr/>
+        <p:txBody>
+          <a:bodyPr/>
+          <a:lstStyle/>
+          <a:p>
+            <a:r>
+              <a:rPr lang="en-US" dirty="0" err="1">
+                <a:latin typeface="Courier New" panose="02070309020205020404" pitchFamily="49" charset="0"/>
+                <a:cs typeface="Courier New" panose="02070309020205020404" pitchFamily="49" charset="0"/>
+              </a:rPr>
+              <a:t>ggplot</a:t>
+            </a:r>
+            <a:r>
+              <a:rPr lang="en-US" dirty="0"/>
+              <a:t> uses </a:t>
+            </a:r>
+            <a:r>
+              <a:rPr lang="en-US" dirty="0">
+                <a:latin typeface="Courier New" panose="02070309020205020404" pitchFamily="49" charset="0"/>
+                <a:cs typeface="Courier New" panose="02070309020205020404" pitchFamily="49" charset="0"/>
+              </a:rPr>
+              <a:t>+ </a:t>
+            </a:r>
+            <a:r>
+              <a:rPr lang="en-US" dirty="0"/>
+              <a:t> to link several layers</a:t>
+            </a:r>
+          </a:p>
+          <a:p>
+            <a:r>
+              <a:rPr lang="en-US" dirty="0"/>
+              <a:t>Just like the pipe, you can combine tons of these together!</a:t>
             </a:r>
           </a:p>
         </p:txBody>
@@ -16635,7 +17872,7 @@
           <p:cNvPr id="4" name="Date Placeholder 3">
             <a:extLst>
               <a:ext uri="{FF2B5EF4-FFF2-40B4-BE49-F238E27FC236}">
-                <a16:creationId xmlns:a16="http://schemas.microsoft.com/office/drawing/2014/main" id="{729242CD-322A-4BBF-A5F9-A0BD7FF80C30}"/>
+                <a16:creationId xmlns:a16="http://schemas.microsoft.com/office/drawing/2014/main" id="{695F9B61-B132-4A1F-956F-C7FA5894868B}"/>
               </a:ext>
             </a:extLst>
           </p:cNvPr>
@@ -16664,7 +17901,7 @@
           <p:cNvPr id="5" name="Footer Placeholder 4">
             <a:extLst>
               <a:ext uri="{FF2B5EF4-FFF2-40B4-BE49-F238E27FC236}">
-                <a16:creationId xmlns:a16="http://schemas.microsoft.com/office/drawing/2014/main" id="{30FAF9A1-04F4-4BAE-9142-17FB314C8EED}"/>
+                <a16:creationId xmlns:a16="http://schemas.microsoft.com/office/drawing/2014/main" id="{DA540B43-4E0D-4617-A8E2-BB5B9401C854}"/>
               </a:ext>
             </a:extLst>
           </p:cNvPr>
@@ -16721,7 +17958,7 @@
           <p:cNvPr id="6" name="Slide Number Placeholder 5">
             <a:extLst>
               <a:ext uri="{FF2B5EF4-FFF2-40B4-BE49-F238E27FC236}">
-                <a16:creationId xmlns:a16="http://schemas.microsoft.com/office/drawing/2014/main" id="{51F51AE9-B6B5-4DDB-B0E8-6F790417F61A}"/>
+                <a16:creationId xmlns:a16="http://schemas.microsoft.com/office/drawing/2014/main" id="{B3BA36E9-613D-4BC5-B0F7-4BBB217DEE0E}"/>
               </a:ext>
             </a:extLst>
           </p:cNvPr>
@@ -16748,7 +17985,7 @@
     </p:spTree>
     <p:extLst>
       <p:ext uri="{BB962C8B-B14F-4D97-AF65-F5344CB8AC3E}">
-        <p14:creationId xmlns:p14="http://schemas.microsoft.com/office/powerpoint/2010/main" val="2106640646"/>
+        <p14:creationId xmlns:p14="http://schemas.microsoft.com/office/powerpoint/2010/main" val="844801094"/>
       </p:ext>
     </p:extLst>
   </p:cSld>
@@ -16777,10 +18014,10 @@
       </p:grpSpPr>
       <p:sp>
         <p:nvSpPr>
-          <p:cNvPr id="2" name="Title 1">
-            <a:extLst>
-              <a:ext uri="{FF2B5EF4-FFF2-40B4-BE49-F238E27FC236}">
-                <a16:creationId xmlns:a16="http://schemas.microsoft.com/office/drawing/2014/main" id="{11D2AEC1-B86D-49DC-8240-FC110A098B47}"/>
+          <p:cNvPr id="7" name="Title 6">
+            <a:extLst>
+              <a:ext uri="{FF2B5EF4-FFF2-40B4-BE49-F238E27FC236}">
+                <a16:creationId xmlns:a16="http://schemas.microsoft.com/office/drawing/2014/main" id="{2C7C7B52-4FB0-4A0B-B5E1-EDD5A9ADA476}"/>
               </a:ext>
             </a:extLst>
           </p:cNvPr>
@@ -16798,54 +18035,35 @@
           <a:p>
             <a:r>
               <a:rPr lang="en-US" dirty="0"/>
-              <a:t>A FULL TIDYVERSE WORKFLOW</a:t>
-            </a:r>
-          </a:p>
-        </p:txBody>
-      </p:sp>
-      <p:sp>
-        <p:nvSpPr>
-          <p:cNvPr id="3" name="Content Placeholder 2">
-            <a:extLst>
-              <a:ext uri="{FF2B5EF4-FFF2-40B4-BE49-F238E27FC236}">
-                <a16:creationId xmlns:a16="http://schemas.microsoft.com/office/drawing/2014/main" id="{70465980-9286-4387-A5A5-A575E6590F74}"/>
-              </a:ext>
-            </a:extLst>
-          </p:cNvPr>
-          <p:cNvSpPr>
-            <a:spLocks noGrp="1"/>
-          </p:cNvSpPr>
-          <p:nvPr>
-            <p:ph idx="1"/>
-          </p:nvPr>
-        </p:nvSpPr>
-        <p:spPr/>
-        <p:txBody>
-          <a:bodyPr/>
-          <a:lstStyle/>
-          <a:p>
-            <a:r>
-              <a:rPr lang="en-US" dirty="0"/>
-              <a:t>You can combine %&gt;% and + to get long, but very readable chains of commands!</a:t>
-            </a:r>
-          </a:p>
-          <a:p>
-            <a:r>
-              <a:rPr lang="en-US" dirty="0"/>
-              <a:t>However, don’t just rely on these alone.</a:t>
-            </a:r>
-          </a:p>
-          <a:p>
-            <a:r>
-              <a:rPr lang="en-US" dirty="0"/>
-              <a:t>If you have too many commands at once, you start to lose track.</a:t>
-            </a:r>
-          </a:p>
-          <a:p>
-            <a:pPr lvl="1"/>
-            <a:r>
-              <a:rPr lang="en-US" dirty="0"/>
-              <a:t>Add intermediate variables!</a:t>
+              <a:t>ALL TOGETHER NOW</a:t>
+            </a:r>
+          </a:p>
+        </p:txBody>
+      </p:sp>
+      <p:sp>
+        <p:nvSpPr>
+          <p:cNvPr id="8" name="Text Placeholder 7">
+            <a:extLst>
+              <a:ext uri="{FF2B5EF4-FFF2-40B4-BE49-F238E27FC236}">
+                <a16:creationId xmlns:a16="http://schemas.microsoft.com/office/drawing/2014/main" id="{235128D3-FA6E-47E7-87E1-272DD4C10B55}"/>
+              </a:ext>
+            </a:extLst>
+          </p:cNvPr>
+          <p:cNvSpPr>
+            <a:spLocks noGrp="1"/>
+          </p:cNvSpPr>
+          <p:nvPr>
+            <p:ph type="body" idx="1"/>
+          </p:nvPr>
+        </p:nvSpPr>
+        <p:spPr/>
+        <p:txBody>
+          <a:bodyPr/>
+          <a:lstStyle/>
+          <a:p>
+            <a:r>
+              <a:rPr lang="en-US" dirty="0"/>
+              <a:t>Integrating all the components</a:t>
             </a:r>
           </a:p>
         </p:txBody>
@@ -16855,7 +18073,7 @@
           <p:cNvPr id="4" name="Date Placeholder 3">
             <a:extLst>
               <a:ext uri="{FF2B5EF4-FFF2-40B4-BE49-F238E27FC236}">
-                <a16:creationId xmlns:a16="http://schemas.microsoft.com/office/drawing/2014/main" id="{4E32AD3C-9F7E-457C-AE3F-422282C0F9E7}"/>
+                <a16:creationId xmlns:a16="http://schemas.microsoft.com/office/drawing/2014/main" id="{729242CD-322A-4BBF-A5F9-A0BD7FF80C30}"/>
               </a:ext>
             </a:extLst>
           </p:cNvPr>
@@ -16884,7 +18102,7 @@
           <p:cNvPr id="5" name="Footer Placeholder 4">
             <a:extLst>
               <a:ext uri="{FF2B5EF4-FFF2-40B4-BE49-F238E27FC236}">
-                <a16:creationId xmlns:a16="http://schemas.microsoft.com/office/drawing/2014/main" id="{FBC1C866-EB47-455D-BF46-BFC503046315}"/>
+                <a16:creationId xmlns:a16="http://schemas.microsoft.com/office/drawing/2014/main" id="{30FAF9A1-04F4-4BAE-9142-17FB314C8EED}"/>
               </a:ext>
             </a:extLst>
           </p:cNvPr>
@@ -16941,7 +18159,7 @@
           <p:cNvPr id="6" name="Slide Number Placeholder 5">
             <a:extLst>
               <a:ext uri="{FF2B5EF4-FFF2-40B4-BE49-F238E27FC236}">
-                <a16:creationId xmlns:a16="http://schemas.microsoft.com/office/drawing/2014/main" id="{2B03362D-7208-43A1-B722-15CB9305C312}"/>
+                <a16:creationId xmlns:a16="http://schemas.microsoft.com/office/drawing/2014/main" id="{51F51AE9-B6B5-4DDB-B0E8-6F790417F61A}"/>
               </a:ext>
             </a:extLst>
           </p:cNvPr>
@@ -16968,7 +18186,7 @@
     </p:spTree>
     <p:extLst>
       <p:ext uri="{BB962C8B-B14F-4D97-AF65-F5344CB8AC3E}">
-        <p14:creationId xmlns:p14="http://schemas.microsoft.com/office/powerpoint/2010/main" val="2605989437"/>
+        <p14:creationId xmlns:p14="http://schemas.microsoft.com/office/powerpoint/2010/main" val="2106640646"/>
       </p:ext>
     </p:extLst>
   </p:cSld>
@@ -17000,7 +18218,7 @@
           <p:cNvPr id="2" name="Title 1">
             <a:extLst>
               <a:ext uri="{FF2B5EF4-FFF2-40B4-BE49-F238E27FC236}">
-                <a16:creationId xmlns:a16="http://schemas.microsoft.com/office/drawing/2014/main" id="{A8909A85-5F97-4785-BA4C-680457A0F1AF}"/>
+                <a16:creationId xmlns:a16="http://schemas.microsoft.com/office/drawing/2014/main" id="{11D2AEC1-B86D-49DC-8240-FC110A098B47}"/>
               </a:ext>
             </a:extLst>
           </p:cNvPr>
@@ -17018,17 +18236,17 @@
           <a:p>
             <a:r>
               <a:rPr lang="en-US" dirty="0"/>
-              <a:t>ACKNOWLEDGEMENTS</a:t>
-            </a:r>
-          </a:p>
-        </p:txBody>
-      </p:sp>
-      <p:sp>
-        <p:nvSpPr>
-          <p:cNvPr id="7" name="Content Placeholder 6">
-            <a:extLst>
-              <a:ext uri="{FF2B5EF4-FFF2-40B4-BE49-F238E27FC236}">
-                <a16:creationId xmlns:a16="http://schemas.microsoft.com/office/drawing/2014/main" id="{063C36B6-F28F-4BE7-9B27-1DD6F6385857}"/>
+              <a:t>A FULL TIDYVERSE WORKFLOW</a:t>
+            </a:r>
+          </a:p>
+        </p:txBody>
+      </p:sp>
+      <p:sp>
+        <p:nvSpPr>
+          <p:cNvPr id="3" name="Content Placeholder 2">
+            <a:extLst>
+              <a:ext uri="{FF2B5EF4-FFF2-40B4-BE49-F238E27FC236}">
+                <a16:creationId xmlns:a16="http://schemas.microsoft.com/office/drawing/2014/main" id="{70465980-9286-4387-A5A5-A575E6590F74}"/>
               </a:ext>
             </a:extLst>
           </p:cNvPr>
@@ -17046,36 +18264,56 @@
           <a:p>
             <a:r>
               <a:rPr lang="en-US" dirty="0"/>
-              <a:t>Much of this tutorial is based on Hadley Wickham’s Amazing </a:t>
+              <a:t>You can combine </a:t>
+            </a:r>
+            <a:r>
+              <a:rPr lang="en-US" dirty="0">
+                <a:latin typeface="Courier New" panose="02070309020205020404" pitchFamily="49" charset="0"/>
+                <a:cs typeface="Courier New" panose="02070309020205020404" pitchFamily="49" charset="0"/>
+              </a:rPr>
+              <a:t>%&gt;%</a:t>
+            </a:r>
+            <a:r>
+              <a:rPr lang="en-US" dirty="0"/>
+              <a:t> and </a:t>
+            </a:r>
+            <a:r>
+              <a:rPr lang="en-US" dirty="0">
+                <a:latin typeface="Courier New" panose="02070309020205020404" pitchFamily="49" charset="0"/>
+                <a:cs typeface="Courier New" panose="02070309020205020404" pitchFamily="49" charset="0"/>
+              </a:rPr>
+              <a:t>+</a:t>
+            </a:r>
+            <a:r>
+              <a:rPr lang="en-US" dirty="0"/>
+              <a:t> to get long, but very readable chains of commands!</a:t>
+            </a:r>
+          </a:p>
+          <a:p>
+            <a:r>
+              <a:rPr lang="en-US" dirty="0"/>
+              <a:t>However, don’t just rely on these alone.</a:t>
+            </a:r>
+          </a:p>
+          <a:p>
+            <a:r>
+              <a:rPr lang="en-US" dirty="0"/>
+              <a:t>If you have too many commands at once, it becomes easy to lose track.</a:t>
+            </a:r>
+          </a:p>
+          <a:p>
+            <a:pPr lvl="1"/>
+            <a:r>
+              <a:rPr lang="en-US" dirty="0"/>
+              <a:t>Add intermediate variables with </a:t>
             </a:r>
             <a:r>
               <a:rPr lang="en-US" i="1" dirty="0"/>
-              <a:t>R For Data Science</a:t>
-            </a:r>
-            <a:r>
-              <a:rPr lang="en-US" dirty="0"/>
-              <a:t>, available for free at </a:t>
-            </a:r>
-            <a:r>
-              <a:rPr lang="en-US" dirty="0">
-                <a:hlinkClick r:id="rId2"/>
-              </a:rPr>
-              <a:t>https://r4ds.had.co.nz</a:t>
-            </a:r>
-            <a:endParaRPr lang="en-US" dirty="0"/>
-          </a:p>
-          <a:p>
-            <a:r>
-              <a:rPr lang="en-US" dirty="0"/>
-              <a:t>The </a:t>
-            </a:r>
-            <a:r>
-              <a:rPr lang="en-US" dirty="0" err="1"/>
-              <a:t>tidyverse</a:t>
-            </a:r>
-            <a:r>
-              <a:rPr lang="en-US" dirty="0"/>
-              <a:t> hex stickers are used under the terms of the Creative Commons 1.0 Universal license.</a:t>
+              <a:t>meaningful</a:t>
+            </a:r>
+            <a:r>
+              <a:rPr lang="en-US" dirty="0"/>
+              <a:t> names!</a:t>
             </a:r>
           </a:p>
         </p:txBody>
@@ -17085,7 +18323,7 @@
           <p:cNvPr id="4" name="Date Placeholder 3">
             <a:extLst>
               <a:ext uri="{FF2B5EF4-FFF2-40B4-BE49-F238E27FC236}">
-                <a16:creationId xmlns:a16="http://schemas.microsoft.com/office/drawing/2014/main" id="{6BD03D3F-8307-4B2B-85E0-9639DD7F7B8C}"/>
+                <a16:creationId xmlns:a16="http://schemas.microsoft.com/office/drawing/2014/main" id="{4E32AD3C-9F7E-457C-AE3F-422282C0F9E7}"/>
               </a:ext>
             </a:extLst>
           </p:cNvPr>
@@ -17114,7 +18352,7 @@
           <p:cNvPr id="5" name="Footer Placeholder 4">
             <a:extLst>
               <a:ext uri="{FF2B5EF4-FFF2-40B4-BE49-F238E27FC236}">
-                <a16:creationId xmlns:a16="http://schemas.microsoft.com/office/drawing/2014/main" id="{07FB1389-2798-4D26-8CCE-27767E9E7F1D}"/>
+                <a16:creationId xmlns:a16="http://schemas.microsoft.com/office/drawing/2014/main" id="{FBC1C866-EB47-455D-BF46-BFC503046315}"/>
               </a:ext>
             </a:extLst>
           </p:cNvPr>
@@ -17171,7 +18409,7 @@
           <p:cNvPr id="6" name="Slide Number Placeholder 5">
             <a:extLst>
               <a:ext uri="{FF2B5EF4-FFF2-40B4-BE49-F238E27FC236}">
-                <a16:creationId xmlns:a16="http://schemas.microsoft.com/office/drawing/2014/main" id="{D9EB88B7-3533-4306-8F51-5BF384EBA51E}"/>
+                <a16:creationId xmlns:a16="http://schemas.microsoft.com/office/drawing/2014/main" id="{2B03362D-7208-43A1-B722-15CB9305C312}"/>
               </a:ext>
             </a:extLst>
           </p:cNvPr>
@@ -17190,6 +18428,236 @@
             <a:fld id="{D57F1E4F-1CFF-5643-939E-02111984F565}" type="slidenum">
               <a:rPr lang="en-US" smtClean="0"/>
               <a:t>47</a:t>
+            </a:fld>
+            <a:endParaRPr lang="en-US" dirty="0"/>
+          </a:p>
+        </p:txBody>
+      </p:sp>
+    </p:spTree>
+    <p:extLst>
+      <p:ext uri="{BB962C8B-B14F-4D97-AF65-F5344CB8AC3E}">
+        <p14:creationId xmlns:p14="http://schemas.microsoft.com/office/powerpoint/2010/main" val="2605989437"/>
+      </p:ext>
+    </p:extLst>
+  </p:cSld>
+  <p:clrMapOvr>
+    <a:masterClrMapping/>
+  </p:clrMapOvr>
+</p:sld>
+</file>
+
+<file path=ppt/slides/slide48.xml><?xml version="1.0" encoding="utf-8"?>
+<p:sld xmlns:a="http://schemas.openxmlformats.org/drawingml/2006/main" xmlns:r="http://schemas.openxmlformats.org/officeDocument/2006/relationships" xmlns:p="http://schemas.openxmlformats.org/presentationml/2006/main">
+  <p:cSld>
+    <p:spTree>
+      <p:nvGrpSpPr>
+        <p:cNvPr id="1" name=""/>
+        <p:cNvGrpSpPr/>
+        <p:nvPr/>
+      </p:nvGrpSpPr>
+      <p:grpSpPr>
+        <a:xfrm>
+          <a:off x="0" y="0"/>
+          <a:ext cx="0" cy="0"/>
+          <a:chOff x="0" y="0"/>
+          <a:chExt cx="0" cy="0"/>
+        </a:xfrm>
+      </p:grpSpPr>
+      <p:sp>
+        <p:nvSpPr>
+          <p:cNvPr id="2" name="Title 1">
+            <a:extLst>
+              <a:ext uri="{FF2B5EF4-FFF2-40B4-BE49-F238E27FC236}">
+                <a16:creationId xmlns:a16="http://schemas.microsoft.com/office/drawing/2014/main" id="{A8909A85-5F97-4785-BA4C-680457A0F1AF}"/>
+              </a:ext>
+            </a:extLst>
+          </p:cNvPr>
+          <p:cNvSpPr>
+            <a:spLocks noGrp="1"/>
+          </p:cNvSpPr>
+          <p:nvPr>
+            <p:ph type="title"/>
+          </p:nvPr>
+        </p:nvSpPr>
+        <p:spPr/>
+        <p:txBody>
+          <a:bodyPr/>
+          <a:lstStyle/>
+          <a:p>
+            <a:r>
+              <a:rPr lang="en-US" dirty="0"/>
+              <a:t>ACKNOWLEDGEMENTS</a:t>
+            </a:r>
+          </a:p>
+        </p:txBody>
+      </p:sp>
+      <p:sp>
+        <p:nvSpPr>
+          <p:cNvPr id="7" name="Content Placeholder 6">
+            <a:extLst>
+              <a:ext uri="{FF2B5EF4-FFF2-40B4-BE49-F238E27FC236}">
+                <a16:creationId xmlns:a16="http://schemas.microsoft.com/office/drawing/2014/main" id="{063C36B6-F28F-4BE7-9B27-1DD6F6385857}"/>
+              </a:ext>
+            </a:extLst>
+          </p:cNvPr>
+          <p:cNvSpPr>
+            <a:spLocks noGrp="1"/>
+          </p:cNvSpPr>
+          <p:nvPr>
+            <p:ph idx="1"/>
+          </p:nvPr>
+        </p:nvSpPr>
+        <p:spPr/>
+        <p:txBody>
+          <a:bodyPr/>
+          <a:lstStyle/>
+          <a:p>
+            <a:r>
+              <a:rPr lang="en-US" dirty="0"/>
+              <a:t>Much of this tutorial is based on Hadley Wickham’s Amazing </a:t>
+            </a:r>
+            <a:r>
+              <a:rPr lang="en-US" i="1" dirty="0"/>
+              <a:t>R For Data Science</a:t>
+            </a:r>
+            <a:r>
+              <a:rPr lang="en-US" dirty="0"/>
+              <a:t>, available for free at </a:t>
+            </a:r>
+            <a:r>
+              <a:rPr lang="en-US" dirty="0">
+                <a:hlinkClick r:id="rId2"/>
+              </a:rPr>
+              <a:t>https://r4ds.had.co.nz</a:t>
+            </a:r>
+            <a:endParaRPr lang="en-US" dirty="0"/>
+          </a:p>
+          <a:p>
+            <a:r>
+              <a:rPr lang="en-US" dirty="0"/>
+              <a:t>The </a:t>
+            </a:r>
+            <a:r>
+              <a:rPr lang="en-US" dirty="0" err="1"/>
+              <a:t>tidyverse</a:t>
+            </a:r>
+            <a:r>
+              <a:rPr lang="en-US" dirty="0"/>
+              <a:t> hex stickers are used under the terms of the Creative Commons 1.0 Universal license.</a:t>
+            </a:r>
+          </a:p>
+        </p:txBody>
+      </p:sp>
+      <p:sp>
+        <p:nvSpPr>
+          <p:cNvPr id="4" name="Date Placeholder 3">
+            <a:extLst>
+              <a:ext uri="{FF2B5EF4-FFF2-40B4-BE49-F238E27FC236}">
+                <a16:creationId xmlns:a16="http://schemas.microsoft.com/office/drawing/2014/main" id="{6BD03D3F-8307-4B2B-85E0-9639DD7F7B8C}"/>
+              </a:ext>
+            </a:extLst>
+          </p:cNvPr>
+          <p:cNvSpPr>
+            <a:spLocks noGrp="1"/>
+          </p:cNvSpPr>
+          <p:nvPr>
+            <p:ph type="dt" sz="half" idx="10"/>
+          </p:nvPr>
+        </p:nvSpPr>
+        <p:spPr/>
+        <p:txBody>
+          <a:bodyPr/>
+          <a:lstStyle/>
+          <a:p>
+            <a:fld id="{8AAE40A0-A7D8-4DC3-BC9E-BADA32DA2004}" type="datetime4">
+              <a:rPr lang="en-US" smtClean="0"/>
+              <a:t>July 7, 2019</a:t>
+            </a:fld>
+            <a:endParaRPr lang="en-US" dirty="0"/>
+          </a:p>
+        </p:txBody>
+      </p:sp>
+      <p:sp>
+        <p:nvSpPr>
+          <p:cNvPr id="5" name="Footer Placeholder 4">
+            <a:extLst>
+              <a:ext uri="{FF2B5EF4-FFF2-40B4-BE49-F238E27FC236}">
+                <a16:creationId xmlns:a16="http://schemas.microsoft.com/office/drawing/2014/main" id="{07FB1389-2798-4D26-8CCE-27767E9E7F1D}"/>
+              </a:ext>
+            </a:extLst>
+          </p:cNvPr>
+          <p:cNvSpPr>
+            <a:spLocks noGrp="1"/>
+          </p:cNvSpPr>
+          <p:nvPr>
+            <p:ph type="ftr" sz="quarter" idx="11"/>
+          </p:nvPr>
+        </p:nvSpPr>
+        <p:spPr/>
+        <p:txBody>
+          <a:bodyPr/>
+          <a:lstStyle/>
+          <a:p>
+            <a:r>
+              <a:rPr lang="en-US"/>
+              <a:t>Digital Scholarship Services </a:t>
+            </a:r>
+            <a:r>
+              <a:rPr lang="en-US">
+                <a:solidFill>
+                  <a:schemeClr val="accent1">
+                    <a:lumMod val="50000"/>
+                  </a:schemeClr>
+                </a:solidFill>
+              </a:rPr>
+              <a:t>| Email</a:t>
+            </a:r>
+            <a:r>
+              <a:rPr lang="en-US"/>
+              <a:t> cf24@rice.edu </a:t>
+            </a:r>
+            <a:r>
+              <a:rPr lang="en-US">
+                <a:solidFill>
+                  <a:schemeClr val="accent1">
+                    <a:lumMod val="50000"/>
+                  </a:schemeClr>
+                </a:solidFill>
+              </a:rPr>
+              <a:t>|</a:t>
+            </a:r>
+            <a:r>
+              <a:rPr lang="en-US"/>
+              <a:t> library.rice.edu/dss</a:t>
+            </a:r>
+            <a:endParaRPr lang="en-US" dirty="0"/>
+          </a:p>
+        </p:txBody>
+      </p:sp>
+      <p:sp>
+        <p:nvSpPr>
+          <p:cNvPr id="6" name="Slide Number Placeholder 5">
+            <a:extLst>
+              <a:ext uri="{FF2B5EF4-FFF2-40B4-BE49-F238E27FC236}">
+                <a16:creationId xmlns:a16="http://schemas.microsoft.com/office/drawing/2014/main" id="{D9EB88B7-3533-4306-8F51-5BF384EBA51E}"/>
+              </a:ext>
+            </a:extLst>
+          </p:cNvPr>
+          <p:cNvSpPr>
+            <a:spLocks noGrp="1"/>
+          </p:cNvSpPr>
+          <p:nvPr>
+            <p:ph type="sldNum" sz="quarter" idx="12"/>
+          </p:nvPr>
+        </p:nvSpPr>
+        <p:spPr/>
+        <p:txBody>
+          <a:bodyPr/>
+          <a:lstStyle/>
+          <a:p>
+            <a:fld id="{D57F1E4F-1CFF-5643-939E-02111984F565}" type="slidenum">
+              <a:rPr lang="en-US" smtClean="0"/>
+              <a:t>48</a:t>
             </a:fld>
             <a:endParaRPr lang="en-US" dirty="0"/>
           </a:p>
@@ -17253,31 +18721,34 @@
           </a:p>
         </p:txBody>
       </p:sp>
-      <p:sp>
-        <p:nvSpPr>
-          <p:cNvPr id="3" name="Content Placeholder 2">
-            <a:extLst>
-              <a:ext uri="{FF2B5EF4-FFF2-40B4-BE49-F238E27FC236}">
-                <a16:creationId xmlns:a16="http://schemas.microsoft.com/office/drawing/2014/main" id="{154026D5-D5E3-443C-90A8-1F589C6CEA44}"/>
-              </a:ext>
-            </a:extLst>
-          </p:cNvPr>
-          <p:cNvSpPr>
-            <a:spLocks noGrp="1"/>
-          </p:cNvSpPr>
+      <p:pic>
+        <p:nvPicPr>
+          <p:cNvPr id="8" name="Content Placeholder 7" descr="A screenshot of a cell phone&#10;&#10;Description automatically generated">
+            <a:extLst>
+              <a:ext uri="{FF2B5EF4-FFF2-40B4-BE49-F238E27FC236}">
+                <a16:creationId xmlns:a16="http://schemas.microsoft.com/office/drawing/2014/main" id="{0FA29421-E87A-447A-A607-E9A36A30C43A}"/>
+              </a:ext>
+            </a:extLst>
+          </p:cNvPr>
+          <p:cNvPicPr>
+            <a:picLocks noGrp="1" noChangeAspect="1"/>
+          </p:cNvPicPr>
           <p:nvPr>
             <p:ph idx="1"/>
           </p:nvPr>
-        </p:nvSpPr>
-        <p:spPr/>
-        <p:txBody>
-          <a:bodyPr/>
-          <a:lstStyle/>
-          <a:p>
-            <a:endParaRPr lang="en-US"/>
-          </a:p>
-        </p:txBody>
-      </p:sp>
+        </p:nvPicPr>
+        <p:blipFill rotWithShape="1">
+          <a:blip r:embed="rId2"/>
+          <a:srcRect l="5411" r="57520" b="70063"/>
+          <a:stretch/>
+        </p:blipFill>
+        <p:spPr>
+          <a:xfrm>
+            <a:off x="2006074" y="2946667"/>
+            <a:ext cx="2305904" cy="1538969"/>
+          </a:xfrm>
+        </p:spPr>
+      </p:pic>
       <p:sp>
         <p:nvSpPr>
           <p:cNvPr id="4" name="Date Placeholder 3">
@@ -17393,6 +18864,35 @@
           </a:p>
         </p:txBody>
       </p:sp>
+      <p:pic>
+        <p:nvPicPr>
+          <p:cNvPr id="10" name="Picture 9" descr="A screenshot of a cell phone&#10;&#10;Description automatically generated">
+            <a:extLst>
+              <a:ext uri="{FF2B5EF4-FFF2-40B4-BE49-F238E27FC236}">
+                <a16:creationId xmlns:a16="http://schemas.microsoft.com/office/drawing/2014/main" id="{0F35356B-396F-4E99-8DAC-59E74F2C6C04}"/>
+              </a:ext>
+            </a:extLst>
+          </p:cNvPr>
+          <p:cNvPicPr>
+            <a:picLocks noChangeAspect="1"/>
+          </p:cNvPicPr>
+          <p:nvPr/>
+        </p:nvPicPr>
+        <p:blipFill rotWithShape="1">
+          <a:blip r:embed="rId3"/>
+          <a:srcRect l="2956" t="-1" r="54829" b="18907"/>
+          <a:stretch/>
+        </p:blipFill>
+        <p:spPr>
+          <a:xfrm>
+            <a:off x="7613373" y="1939611"/>
+            <a:ext cx="2663686" cy="3723272"/>
+          </a:xfrm>
+          <a:prstGeom prst="rect">
+            <a:avLst/>
+          </a:prstGeom>
+        </p:spPr>
+      </p:pic>
     </p:spTree>
     <p:extLst>
       <p:ext uri="{BB962C8B-B14F-4D97-AF65-F5344CB8AC3E}">
@@ -17467,9 +18967,16 @@
             <p:ph idx="1"/>
           </p:nvPr>
         </p:nvSpPr>
-        <p:spPr/>
-        <p:txBody>
-          <a:bodyPr/>
+        <p:spPr>
+          <a:xfrm>
+            <a:off x="838200" y="1825625"/>
+            <a:ext cx="5029200" cy="4351338"/>
+          </a:xfrm>
+        </p:spPr>
+        <p:txBody>
+          <a:bodyPr>
+            <a:normAutofit lnSpcReduction="10000"/>
+          </a:bodyPr>
           <a:lstStyle/>
           <a:p>
             <a:r>
@@ -17477,17 +18984,89 @@
                 <a:latin typeface="Courier New" panose="02070309020205020404" pitchFamily="49" charset="0"/>
                 <a:cs typeface="Courier New" panose="02070309020205020404" pitchFamily="49" charset="0"/>
               </a:rPr>
-              <a:t>scatter</a:t>
-            </a:r>
-          </a:p>
-          <a:p>
+              <a:t>spread</a:t>
+            </a:r>
+          </a:p>
+          <a:p>
+            <a:pPr lvl="1"/>
             <a:r>
               <a:rPr lang="en-US" dirty="0">
+                <a:cs typeface="Courier New" panose="02070309020205020404" pitchFamily="49" charset="0"/>
+              </a:rPr>
+              <a:t>If there are two columns worth of data in one column</a:t>
+            </a:r>
+          </a:p>
+          <a:p>
+            <a:pPr lvl="1"/>
+            <a:r>
+              <a:rPr lang="en-US" dirty="0">
+                <a:latin typeface="Courier New" panose="02070309020205020404" pitchFamily="49" charset="0"/>
+                <a:cs typeface="Courier New" panose="02070309020205020404" pitchFamily="49" charset="0"/>
+              </a:rPr>
+              <a:t>spread(table, TYPE OF OBSERVATION, VALUE)</a:t>
+            </a:r>
+          </a:p>
+          <a:p>
+            <a:r>
+              <a:rPr lang="en-US" dirty="0">
                 <a:latin typeface="Courier New" panose="02070309020205020404" pitchFamily="49" charset="0"/>
                 <a:cs typeface="Courier New" panose="02070309020205020404" pitchFamily="49" charset="0"/>
               </a:rPr>
               <a:t>gather</a:t>
             </a:r>
+          </a:p>
+          <a:p>
+            <a:pPr lvl="1"/>
+            <a:r>
+              <a:rPr lang="en-US" dirty="0">
+                <a:cs typeface="Courier New" panose="02070309020205020404" pitchFamily="49" charset="0"/>
+              </a:rPr>
+              <a:t>If one column worth of data is spread across many columns</a:t>
+            </a:r>
+          </a:p>
+          <a:p>
+            <a:pPr lvl="1"/>
+            <a:r>
+              <a:rPr lang="en-US" dirty="0">
+                <a:latin typeface="Courier New" panose="02070309020205020404" pitchFamily="49" charset="0"/>
+                <a:cs typeface="Courier New" panose="02070309020205020404" pitchFamily="49" charset="0"/>
+              </a:rPr>
+              <a:t>gather(table, </a:t>
+            </a:r>
+            <a:r>
+              <a:rPr lang="en-US" dirty="0" err="1">
+                <a:latin typeface="Courier New" panose="02070309020205020404" pitchFamily="49" charset="0"/>
+                <a:cs typeface="Courier New" panose="02070309020205020404" pitchFamily="49" charset="0"/>
+              </a:rPr>
+              <a:t>firstcol</a:t>
+            </a:r>
+            <a:r>
+              <a:rPr lang="en-US" dirty="0">
+                <a:latin typeface="Courier New" panose="02070309020205020404" pitchFamily="49" charset="0"/>
+                <a:cs typeface="Courier New" panose="02070309020205020404" pitchFamily="49" charset="0"/>
+              </a:rPr>
+              <a:t>, </a:t>
+            </a:r>
+            <a:r>
+              <a:rPr lang="en-US" dirty="0" err="1">
+                <a:latin typeface="Courier New" panose="02070309020205020404" pitchFamily="49" charset="0"/>
+                <a:cs typeface="Courier New" panose="02070309020205020404" pitchFamily="49" charset="0"/>
+              </a:rPr>
+              <a:t>secondcol</a:t>
+            </a:r>
+            <a:r>
+              <a:rPr lang="en-US" dirty="0">
+                <a:latin typeface="Courier New" panose="02070309020205020404" pitchFamily="49" charset="0"/>
+                <a:cs typeface="Courier New" panose="02070309020205020404" pitchFamily="49" charset="0"/>
+              </a:rPr>
+              <a:t>, columnname1, columnname2)</a:t>
+            </a:r>
+          </a:p>
+          <a:p>
+            <a:endParaRPr lang="en-US" dirty="0">
+              <a:latin typeface="Courier New" panose="02070309020205020404" pitchFamily="49" charset="0"/>
+              <a:cs typeface="Courier New" panose="02070309020205020404" pitchFamily="49" charset="0"/>
+            </a:endParaRPr>
           </a:p>
         </p:txBody>
       </p:sp>
@@ -17606,6 +19185,66 @@
           </a:p>
         </p:txBody>
       </p:sp>
+      <p:pic>
+        <p:nvPicPr>
+          <p:cNvPr id="8" name="Picture 7" descr="A screenshot of a cell phone&#10;&#10;Description automatically generated">
+            <a:extLst>
+              <a:ext uri="{FF2B5EF4-FFF2-40B4-BE49-F238E27FC236}">
+                <a16:creationId xmlns:a16="http://schemas.microsoft.com/office/drawing/2014/main" id="{FE227FF8-9B1B-4820-AF72-C509BBAC47C9}"/>
+              </a:ext>
+            </a:extLst>
+          </p:cNvPr>
+          <p:cNvPicPr>
+            <a:picLocks noChangeAspect="1"/>
+          </p:cNvPicPr>
+          <p:nvPr/>
+        </p:nvPicPr>
+        <p:blipFill>
+          <a:blip r:embed="rId2"/>
+          <a:stretch>
+            <a:fillRect/>
+          </a:stretch>
+        </p:blipFill>
+        <p:spPr>
+          <a:xfrm>
+            <a:off x="7714687" y="3639001"/>
+            <a:ext cx="3012557" cy="2489544"/>
+          </a:xfrm>
+          <a:prstGeom prst="rect">
+            <a:avLst/>
+          </a:prstGeom>
+        </p:spPr>
+      </p:pic>
+      <p:pic>
+        <p:nvPicPr>
+          <p:cNvPr id="10" name="Picture 9" descr="A screenshot of a cell phone&#10;&#10;Description automatically generated">
+            <a:extLst>
+              <a:ext uri="{FF2B5EF4-FFF2-40B4-BE49-F238E27FC236}">
+                <a16:creationId xmlns:a16="http://schemas.microsoft.com/office/drawing/2014/main" id="{90694A06-20A2-42A8-878E-FE48E076A0E5}"/>
+              </a:ext>
+            </a:extLst>
+          </p:cNvPr>
+          <p:cNvPicPr>
+            <a:picLocks noChangeAspect="1"/>
+          </p:cNvPicPr>
+          <p:nvPr/>
+        </p:nvPicPr>
+        <p:blipFill>
+          <a:blip r:embed="rId3"/>
+          <a:stretch>
+            <a:fillRect/>
+          </a:stretch>
+        </p:blipFill>
+        <p:spPr>
+          <a:xfrm>
+            <a:off x="7611908" y="640912"/>
+            <a:ext cx="3421345" cy="2489544"/>
+          </a:xfrm>
+          <a:prstGeom prst="rect">
+            <a:avLst/>
+          </a:prstGeom>
+        </p:spPr>
+      </p:pic>
     </p:spTree>
     <p:extLst>
       <p:ext uri="{BB962C8B-B14F-4D97-AF65-F5344CB8AC3E}">
@@ -18842,4 +20481,47 @@
     </a:ext>
   </a:extLst>
 </a:theme>
+</file>
+
+<file path=ppt/theme/themeOverride1.xml><?xml version="1.0" encoding="utf-8"?>
+<a:themeOverride xmlns:a="http://schemas.openxmlformats.org/drawingml/2006/main">
+  <a:clrScheme name="Office">
+    <a:dk1>
+      <a:sysClr val="windowText" lastClr="000000"/>
+    </a:dk1>
+    <a:lt1>
+      <a:sysClr val="window" lastClr="FFFFFF"/>
+    </a:lt1>
+    <a:dk2>
+      <a:srgbClr val="44546A"/>
+    </a:dk2>
+    <a:lt2>
+      <a:srgbClr val="E7E6E6"/>
+    </a:lt2>
+    <a:accent1>
+      <a:srgbClr val="5B9BD5"/>
+    </a:accent1>
+    <a:accent2>
+      <a:srgbClr val="ED7D31"/>
+    </a:accent2>
+    <a:accent3>
+      <a:srgbClr val="A5A5A5"/>
+    </a:accent3>
+    <a:accent4>
+      <a:srgbClr val="FFC000"/>
+    </a:accent4>
+    <a:accent5>
+      <a:srgbClr val="4472C4"/>
+    </a:accent5>
+    <a:accent6>
+      <a:srgbClr val="70AD47"/>
+    </a:accent6>
+    <a:hlink>
+      <a:srgbClr val="0563C1"/>
+    </a:hlink>
+    <a:folHlink>
+      <a:srgbClr val="954F72"/>
+    </a:folHlink>
+  </a:clrScheme>
+</a:themeOverride>
 </file>
</xml_diff>